<commit_message>
updated files are added
</commit_message>
<xml_diff>
--- a/oops_ppt.pptx
+++ b/oops_ppt.pptx
@@ -7,6 +7,16 @@
   <p:sldIdLst>
     <p:sldId id="256" r:id="rId2"/>
     <p:sldId id="257" r:id="rId3"/>
+    <p:sldId id="258" r:id="rId4"/>
+    <p:sldId id="259" r:id="rId5"/>
+    <p:sldId id="260" r:id="rId6"/>
+    <p:sldId id="261" r:id="rId7"/>
+    <p:sldId id="262" r:id="rId8"/>
+    <p:sldId id="263" r:id="rId9"/>
+    <p:sldId id="264" r:id="rId10"/>
+    <p:sldId id="266" r:id="rId11"/>
+    <p:sldId id="265" r:id="rId12"/>
+    <p:sldId id="267" r:id="rId13"/>
   </p:sldIdLst>
   <p:sldSz cx="12192000" cy="6858000"/>
   <p:notesSz cx="6858000" cy="9144000"/>
@@ -105,6 +115,11 @@
       </a:defRPr>
     </a:lvl9pPr>
   </p:defaultTextStyle>
+  <p:extLst>
+    <p:ext uri="{EFAFB233-063F-42B5-8137-9DF3F51BA10A}">
+      <p15:sldGuideLst xmlns:p15="http://schemas.microsoft.com/office/powerpoint/2012/main"/>
+    </p:ext>
+  </p:extLst>
 </p:presentation>
 </file>
 
@@ -257,7 +272,7 @@
           <a:p>
             <a:fld id="{59F42532-BA7F-4A9D-9194-6DEA6E705578}" type="datetimeFigureOut">
               <a:rPr lang="en-IN" smtClean="0"/>
-              <a:t>23-11-2021</a:t>
+              <a:t>25-11-2021</a:t>
             </a:fld>
             <a:endParaRPr lang="en-IN"/>
           </a:p>
@@ -457,7 +472,7 @@
           <a:p>
             <a:fld id="{59F42532-BA7F-4A9D-9194-6DEA6E705578}" type="datetimeFigureOut">
               <a:rPr lang="en-IN" smtClean="0"/>
-              <a:t>23-11-2021</a:t>
+              <a:t>25-11-2021</a:t>
             </a:fld>
             <a:endParaRPr lang="en-IN"/>
           </a:p>
@@ -667,7 +682,7 @@
           <a:p>
             <a:fld id="{59F42532-BA7F-4A9D-9194-6DEA6E705578}" type="datetimeFigureOut">
               <a:rPr lang="en-IN" smtClean="0"/>
-              <a:t>23-11-2021</a:t>
+              <a:t>25-11-2021</a:t>
             </a:fld>
             <a:endParaRPr lang="en-IN"/>
           </a:p>
@@ -867,7 +882,7 @@
           <a:p>
             <a:fld id="{59F42532-BA7F-4A9D-9194-6DEA6E705578}" type="datetimeFigureOut">
               <a:rPr lang="en-IN" smtClean="0"/>
-              <a:t>23-11-2021</a:t>
+              <a:t>25-11-2021</a:t>
             </a:fld>
             <a:endParaRPr lang="en-IN"/>
           </a:p>
@@ -1143,7 +1158,7 @@
           <a:p>
             <a:fld id="{59F42532-BA7F-4A9D-9194-6DEA6E705578}" type="datetimeFigureOut">
               <a:rPr lang="en-IN" smtClean="0"/>
-              <a:t>23-11-2021</a:t>
+              <a:t>25-11-2021</a:t>
             </a:fld>
             <a:endParaRPr lang="en-IN"/>
           </a:p>
@@ -1411,7 +1426,7 @@
           <a:p>
             <a:fld id="{59F42532-BA7F-4A9D-9194-6DEA6E705578}" type="datetimeFigureOut">
               <a:rPr lang="en-IN" smtClean="0"/>
-              <a:t>23-11-2021</a:t>
+              <a:t>25-11-2021</a:t>
             </a:fld>
             <a:endParaRPr lang="en-IN"/>
           </a:p>
@@ -1826,7 +1841,7 @@
           <a:p>
             <a:fld id="{59F42532-BA7F-4A9D-9194-6DEA6E705578}" type="datetimeFigureOut">
               <a:rPr lang="en-IN" smtClean="0"/>
-              <a:t>23-11-2021</a:t>
+              <a:t>25-11-2021</a:t>
             </a:fld>
             <a:endParaRPr lang="en-IN"/>
           </a:p>
@@ -1968,7 +1983,7 @@
           <a:p>
             <a:fld id="{59F42532-BA7F-4A9D-9194-6DEA6E705578}" type="datetimeFigureOut">
               <a:rPr lang="en-IN" smtClean="0"/>
-              <a:t>23-11-2021</a:t>
+              <a:t>25-11-2021</a:t>
             </a:fld>
             <a:endParaRPr lang="en-IN"/>
           </a:p>
@@ -2081,7 +2096,7 @@
           <a:p>
             <a:fld id="{59F42532-BA7F-4A9D-9194-6DEA6E705578}" type="datetimeFigureOut">
               <a:rPr lang="en-IN" smtClean="0"/>
-              <a:t>23-11-2021</a:t>
+              <a:t>25-11-2021</a:t>
             </a:fld>
             <a:endParaRPr lang="en-IN"/>
           </a:p>
@@ -2394,7 +2409,7 @@
           <a:p>
             <a:fld id="{59F42532-BA7F-4A9D-9194-6DEA6E705578}" type="datetimeFigureOut">
               <a:rPr lang="en-IN" smtClean="0"/>
-              <a:t>23-11-2021</a:t>
+              <a:t>25-11-2021</a:t>
             </a:fld>
             <a:endParaRPr lang="en-IN"/>
           </a:p>
@@ -2683,7 +2698,7 @@
           <a:p>
             <a:fld id="{59F42532-BA7F-4A9D-9194-6DEA6E705578}" type="datetimeFigureOut">
               <a:rPr lang="en-IN" smtClean="0"/>
-              <a:t>23-11-2021</a:t>
+              <a:t>25-11-2021</a:t>
             </a:fld>
             <a:endParaRPr lang="en-IN"/>
           </a:p>
@@ -2926,7 +2941,7 @@
           <a:p>
             <a:fld id="{59F42532-BA7F-4A9D-9194-6DEA6E705578}" type="datetimeFigureOut">
               <a:rPr lang="en-IN" smtClean="0"/>
-              <a:t>23-11-2021</a:t>
+              <a:t>25-11-2021</a:t>
             </a:fld>
             <a:endParaRPr lang="en-IN"/>
           </a:p>
@@ -3343,48 +3358,12 @@
           <a:chExt cx="0" cy="0"/>
         </a:xfrm>
       </p:grpSpPr>
-      <p:pic>
-        <p:nvPicPr>
-          <p:cNvPr id="5" name="Picture 4">
-            <a:extLst>
-              <a:ext uri="{FF2B5EF4-FFF2-40B4-BE49-F238E27FC236}">
-                <a16:creationId xmlns:a16="http://schemas.microsoft.com/office/drawing/2014/main" id="{D779555C-2D7C-48C9-9F47-F0353E9B4D2D}"/>
-              </a:ext>
-            </a:extLst>
-          </p:cNvPr>
-          <p:cNvPicPr>
-            <a:picLocks noChangeAspect="1"/>
-          </p:cNvPicPr>
-          <p:nvPr/>
-        </p:nvPicPr>
-        <p:blipFill>
-          <a:blip r:embed="rId2">
-            <a:extLst>
-              <a:ext uri="{28A0092B-C50C-407E-A947-70E740481C1C}">
-                <a14:useLocalDpi xmlns:a14="http://schemas.microsoft.com/office/drawing/2010/main" val="0"/>
-              </a:ext>
-            </a:extLst>
-          </a:blip>
-          <a:stretch>
-            <a:fillRect/>
-          </a:stretch>
-        </p:blipFill>
-        <p:spPr>
-          <a:xfrm>
-            <a:off x="5341891" y="1445620"/>
-            <a:ext cx="7971241" cy="6500947"/>
-          </a:xfrm>
-          <a:prstGeom prst="rect">
-            <a:avLst/>
-          </a:prstGeom>
-        </p:spPr>
-      </p:pic>
-      <p:sp>
-        <p:nvSpPr>
-          <p:cNvPr id="11" name="Rectangle 10">
-            <a:extLst>
-              <a:ext uri="{FF2B5EF4-FFF2-40B4-BE49-F238E27FC236}">
-                <a16:creationId xmlns:a16="http://schemas.microsoft.com/office/drawing/2014/main" id="{CAECEF10-8B5B-432A-A219-34BAA1687BB0}"/>
+      <p:sp>
+        <p:nvSpPr>
+          <p:cNvPr id="8" name="Rectangle 7">
+            <a:extLst>
+              <a:ext uri="{FF2B5EF4-FFF2-40B4-BE49-F238E27FC236}">
+                <a16:creationId xmlns:a16="http://schemas.microsoft.com/office/drawing/2014/main" id="{9B4E212F-69E1-4220-8723-A9F33AD16C31}"/>
               </a:ext>
             </a:extLst>
           </p:cNvPr>
@@ -3393,14 +3372,14 @@
         </p:nvSpPr>
         <p:spPr>
           <a:xfrm>
-            <a:off x="-783773" y="1315648"/>
-            <a:ext cx="15457715" cy="461665"/>
+            <a:off x="-212035" y="-21771"/>
+            <a:ext cx="12854609" cy="1611086"/>
           </a:xfrm>
           <a:prstGeom prst="rect">
             <a:avLst/>
           </a:prstGeom>
           <a:solidFill>
-            <a:schemeClr val="accent5"/>
+            <a:srgbClr val="323C4D"/>
           </a:solidFill>
           <a:ln>
             <a:noFill/>
@@ -3427,16 +3406,103 @@
           <a:lstStyle/>
           <a:p>
             <a:pPr algn="ctr"/>
-            <a:endParaRPr lang="en-IN"/>
-          </a:p>
-        </p:txBody>
-      </p:sp>
-      <p:sp>
-        <p:nvSpPr>
-          <p:cNvPr id="12" name="Rectangle 11">
-            <a:extLst>
-              <a:ext uri="{FF2B5EF4-FFF2-40B4-BE49-F238E27FC236}">
-                <a16:creationId xmlns:a16="http://schemas.microsoft.com/office/drawing/2014/main" id="{16D53D3D-B4C3-4CCB-AB7A-EF34F2E6EB83}"/>
+            <a:endParaRPr lang="en-IN" dirty="0"/>
+          </a:p>
+        </p:txBody>
+      </p:sp>
+      <p:pic>
+        <p:nvPicPr>
+          <p:cNvPr id="19" name="Picture 18">
+            <a:extLst>
+              <a:ext uri="{FF2B5EF4-FFF2-40B4-BE49-F238E27FC236}">
+                <a16:creationId xmlns:a16="http://schemas.microsoft.com/office/drawing/2014/main" id="{07E2632F-D614-4140-8C57-5939617C5424}"/>
+              </a:ext>
+            </a:extLst>
+          </p:cNvPr>
+          <p:cNvPicPr>
+            <a:picLocks noChangeAspect="1"/>
+          </p:cNvPicPr>
+          <p:nvPr/>
+        </p:nvPicPr>
+        <p:blipFill>
+          <a:blip r:embed="rId2">
+            <a:extLst>
+              <a:ext uri="{BEBA8EAE-BF5A-486C-A8C5-ECC9F3942E4B}">
+                <a14:imgProps xmlns:a14="http://schemas.microsoft.com/office/drawing/2010/main">
+                  <a14:imgLayer r:embed="rId3">
+                    <a14:imgEffect>
+                      <a14:sharpenSoften amount="-50000"/>
+                    </a14:imgEffect>
+                    <a14:imgEffect>
+                      <a14:saturation sat="33000"/>
+                    </a14:imgEffect>
+                    <a14:imgEffect>
+                      <a14:brightnessContrast bright="-20000" contrast="40000"/>
+                    </a14:imgEffect>
+                  </a14:imgLayer>
+                </a14:imgProps>
+              </a:ext>
+              <a:ext uri="{28A0092B-C50C-407E-A947-70E740481C1C}">
+                <a14:useLocalDpi xmlns:a14="http://schemas.microsoft.com/office/drawing/2010/main" val="0"/>
+              </a:ext>
+            </a:extLst>
+          </a:blip>
+          <a:stretch>
+            <a:fillRect/>
+          </a:stretch>
+        </p:blipFill>
+        <p:spPr>
+          <a:xfrm>
+            <a:off x="-212035" y="-385933"/>
+            <a:ext cx="13060130" cy="2048557"/>
+          </a:xfrm>
+          <a:prstGeom prst="rect">
+            <a:avLst/>
+          </a:prstGeom>
+        </p:spPr>
+      </p:pic>
+      <p:pic>
+        <p:nvPicPr>
+          <p:cNvPr id="5" name="Picture 4">
+            <a:extLst>
+              <a:ext uri="{FF2B5EF4-FFF2-40B4-BE49-F238E27FC236}">
+                <a16:creationId xmlns:a16="http://schemas.microsoft.com/office/drawing/2014/main" id="{D779555C-2D7C-48C9-9F47-F0353E9B4D2D}"/>
+              </a:ext>
+            </a:extLst>
+          </p:cNvPr>
+          <p:cNvPicPr>
+            <a:picLocks noChangeAspect="1"/>
+          </p:cNvPicPr>
+          <p:nvPr/>
+        </p:nvPicPr>
+        <p:blipFill>
+          <a:blip r:embed="rId4">
+            <a:extLst>
+              <a:ext uri="{28A0092B-C50C-407E-A947-70E740481C1C}">
+                <a14:useLocalDpi xmlns:a14="http://schemas.microsoft.com/office/drawing/2010/main" val="0"/>
+              </a:ext>
+            </a:extLst>
+          </a:blip>
+          <a:stretch>
+            <a:fillRect/>
+          </a:stretch>
+        </p:blipFill>
+        <p:spPr>
+          <a:xfrm>
+            <a:off x="5341891" y="1662624"/>
+            <a:ext cx="7971241" cy="6283943"/>
+          </a:xfrm>
+          <a:prstGeom prst="rect">
+            <a:avLst/>
+          </a:prstGeom>
+        </p:spPr>
+      </p:pic>
+      <p:sp>
+        <p:nvSpPr>
+          <p:cNvPr id="11" name="Rectangle 10">
+            <a:extLst>
+              <a:ext uri="{FF2B5EF4-FFF2-40B4-BE49-F238E27FC236}">
+                <a16:creationId xmlns:a16="http://schemas.microsoft.com/office/drawing/2014/main" id="{CAECEF10-8B5B-432A-A219-34BAA1687BB0}"/>
               </a:ext>
             </a:extLst>
           </p:cNvPr>
@@ -3445,14 +3511,14 @@
         </p:nvSpPr>
         <p:spPr>
           <a:xfrm>
-            <a:off x="6259386" y="1315649"/>
-            <a:ext cx="8784677" cy="461668"/>
+            <a:off x="-783773" y="1662627"/>
+            <a:ext cx="15457715" cy="223174"/>
           </a:xfrm>
           <a:prstGeom prst="rect">
             <a:avLst/>
           </a:prstGeom>
           <a:solidFill>
-            <a:srgbClr val="29679F"/>
+            <a:schemeClr val="accent5"/>
           </a:solidFill>
           <a:ln>
             <a:noFill/>
@@ -3483,47 +3549,12 @@
           </a:p>
         </p:txBody>
       </p:sp>
-      <p:pic>
-        <p:nvPicPr>
-          <p:cNvPr id="7" name="Picture 6">
-            <a:extLst>
-              <a:ext uri="{FF2B5EF4-FFF2-40B4-BE49-F238E27FC236}">
-                <a16:creationId xmlns:a16="http://schemas.microsoft.com/office/drawing/2014/main" id="{B1AF154C-0CA8-40D3-8B3E-D2A33151A76C}"/>
-              </a:ext>
-            </a:extLst>
-          </p:cNvPr>
-          <p:cNvPicPr>
-            <a:picLocks noChangeAspect="1"/>
-          </p:cNvPicPr>
-          <p:nvPr/>
-        </p:nvPicPr>
-        <p:blipFill rotWithShape="1">
-          <a:blip r:embed="rId3">
-            <a:extLst>
-              <a:ext uri="{28A0092B-C50C-407E-A947-70E740481C1C}">
-                <a14:useLocalDpi xmlns:a14="http://schemas.microsoft.com/office/drawing/2010/main" val="0"/>
-              </a:ext>
-            </a:extLst>
-          </a:blip>
-          <a:srcRect l="23228" r="16502" b="29775"/>
-          <a:stretch/>
-        </p:blipFill>
-        <p:spPr>
-          <a:xfrm>
-            <a:off x="8560021" y="3573094"/>
-            <a:ext cx="1520149" cy="1771247"/>
-          </a:xfrm>
-          <a:prstGeom prst="rect">
-            <a:avLst/>
-          </a:prstGeom>
-        </p:spPr>
-      </p:pic>
-      <p:sp>
-        <p:nvSpPr>
-          <p:cNvPr id="8" name="Rectangle 7">
-            <a:extLst>
-              <a:ext uri="{FF2B5EF4-FFF2-40B4-BE49-F238E27FC236}">
-                <a16:creationId xmlns:a16="http://schemas.microsoft.com/office/drawing/2014/main" id="{9B4E212F-69E1-4220-8723-A9F33AD16C31}"/>
+      <p:sp>
+        <p:nvSpPr>
+          <p:cNvPr id="12" name="Rectangle 11">
+            <a:extLst>
+              <a:ext uri="{FF2B5EF4-FFF2-40B4-BE49-F238E27FC236}">
+                <a16:creationId xmlns:a16="http://schemas.microsoft.com/office/drawing/2014/main" id="{16D53D3D-B4C3-4CCB-AB7A-EF34F2E6EB83}"/>
               </a:ext>
             </a:extLst>
           </p:cNvPr>
@@ -3532,14 +3563,14 @@
         </p:nvSpPr>
         <p:spPr>
           <a:xfrm>
-            <a:off x="-212035" y="-21771"/>
-            <a:ext cx="12854609" cy="1611086"/>
+            <a:off x="6259386" y="1662629"/>
+            <a:ext cx="8784677" cy="223175"/>
           </a:xfrm>
           <a:prstGeom prst="rect">
             <a:avLst/>
           </a:prstGeom>
           <a:solidFill>
-            <a:srgbClr val="323C4D"/>
+            <a:srgbClr val="29679F"/>
           </a:solidFill>
           <a:ln>
             <a:noFill/>
@@ -3566,10 +3597,45 @@
           <a:lstStyle/>
           <a:p>
             <a:pPr algn="ctr"/>
-            <a:endParaRPr lang="en-IN" dirty="0"/>
-          </a:p>
-        </p:txBody>
-      </p:sp>
+            <a:endParaRPr lang="en-IN"/>
+          </a:p>
+        </p:txBody>
+      </p:sp>
+      <p:pic>
+        <p:nvPicPr>
+          <p:cNvPr id="7" name="Picture 6">
+            <a:extLst>
+              <a:ext uri="{FF2B5EF4-FFF2-40B4-BE49-F238E27FC236}">
+                <a16:creationId xmlns:a16="http://schemas.microsoft.com/office/drawing/2014/main" id="{B1AF154C-0CA8-40D3-8B3E-D2A33151A76C}"/>
+              </a:ext>
+            </a:extLst>
+          </p:cNvPr>
+          <p:cNvPicPr>
+            <a:picLocks noChangeAspect="1"/>
+          </p:cNvPicPr>
+          <p:nvPr/>
+        </p:nvPicPr>
+        <p:blipFill rotWithShape="1">
+          <a:blip r:embed="rId5">
+            <a:extLst>
+              <a:ext uri="{28A0092B-C50C-407E-A947-70E740481C1C}">
+                <a14:useLocalDpi xmlns:a14="http://schemas.microsoft.com/office/drawing/2010/main" val="0"/>
+              </a:ext>
+            </a:extLst>
+          </a:blip>
+          <a:srcRect l="23228" r="16502" b="29775"/>
+          <a:stretch/>
+        </p:blipFill>
+        <p:spPr>
+          <a:xfrm>
+            <a:off x="8560021" y="3666082"/>
+            <a:ext cx="1520149" cy="1771247"/>
+          </a:xfrm>
+          <a:prstGeom prst="rect">
+            <a:avLst/>
+          </a:prstGeom>
+        </p:spPr>
+      </p:pic>
       <p:sp>
         <p:nvSpPr>
           <p:cNvPr id="9" name="TextBox 8">
@@ -3647,7 +3713,7 @@
                     <a:lumMod val="75000"/>
                   </a:schemeClr>
                 </a:solidFill>
-                <a:hlinkClick r:id="rId4" tooltip="2021 IT PCC-CS503 TH - OBJECT ORIENTED PROGRAMMING">
+                <a:hlinkClick r:id="rId6" tooltip="2021 IT PCC-CS503 TH - OBJECT ORIENTED PROGRAMMING">
                   <a:extLst>
                     <a:ext uri="{A12FA001-AC4F-418D-AE19-62706E023703}">
                       <ahyp:hlinkClr xmlns:ahyp="http://schemas.microsoft.com/office/drawing/2018/hyperlinkcolor" val="tx"/>
@@ -3956,6 +4022,1101 @@
   <p:clrMapOvr>
     <a:masterClrMapping/>
   </p:clrMapOvr>
+  <mc:AlternateContent xmlns:mc="http://schemas.openxmlformats.org/markup-compatibility/2006">
+    <mc:Choice xmlns:p159="http://schemas.microsoft.com/office/powerpoint/2015/09/main" Requires="p159">
+      <p:transition xmlns:p14="http://schemas.microsoft.com/office/powerpoint/2010/main" spd="slow" p14:dur="2000">
+        <p159:morph option="byObject"/>
+      </p:transition>
+    </mc:Choice>
+    <mc:Fallback>
+      <p:transition spd="slow">
+        <p:fade/>
+      </p:transition>
+    </mc:Fallback>
+  </mc:AlternateContent>
+</p:sld>
+</file>
+
+<file path=ppt/slides/slide10.xml><?xml version="1.0" encoding="utf-8"?>
+<p:sld xmlns:a="http://schemas.openxmlformats.org/drawingml/2006/main" xmlns:r="http://schemas.openxmlformats.org/officeDocument/2006/relationships" xmlns:p="http://schemas.openxmlformats.org/presentationml/2006/main">
+  <p:cSld>
+    <p:spTree>
+      <p:nvGrpSpPr>
+        <p:cNvPr id="1" name=""/>
+        <p:cNvGrpSpPr/>
+        <p:nvPr/>
+      </p:nvGrpSpPr>
+      <p:grpSpPr>
+        <a:xfrm>
+          <a:off x="0" y="0"/>
+          <a:ext cx="0" cy="0"/>
+          <a:chOff x="0" y="0"/>
+          <a:chExt cx="0" cy="0"/>
+        </a:xfrm>
+      </p:grpSpPr>
+      <p:sp>
+        <p:nvSpPr>
+          <p:cNvPr id="5" name="Rectangle 4">
+            <a:extLst>
+              <a:ext uri="{FF2B5EF4-FFF2-40B4-BE49-F238E27FC236}">
+                <a16:creationId xmlns:a16="http://schemas.microsoft.com/office/drawing/2014/main" id="{9DFA2175-0534-45FC-A2EF-A3A491CE4ED4}"/>
+              </a:ext>
+            </a:extLst>
+          </p:cNvPr>
+          <p:cNvSpPr/>
+          <p:nvPr/>
+        </p:nvSpPr>
+        <p:spPr>
+          <a:xfrm>
+            <a:off x="0" y="0"/>
+            <a:ext cx="12192000" cy="2402238"/>
+          </a:xfrm>
+          <a:prstGeom prst="rect">
+            <a:avLst/>
+          </a:prstGeom>
+          <a:solidFill>
+            <a:srgbClr val="323C4D"/>
+          </a:solidFill>
+          <a:ln>
+            <a:noFill/>
+          </a:ln>
+        </p:spPr>
+        <p:style>
+          <a:lnRef idx="2">
+            <a:schemeClr val="accent1">
+              <a:shade val="50000"/>
+            </a:schemeClr>
+          </a:lnRef>
+          <a:fillRef idx="1">
+            <a:schemeClr val="accent1"/>
+          </a:fillRef>
+          <a:effectRef idx="0">
+            <a:schemeClr val="accent1"/>
+          </a:effectRef>
+          <a:fontRef idx="minor">
+            <a:schemeClr val="lt1"/>
+          </a:fontRef>
+        </p:style>
+        <p:txBody>
+          <a:bodyPr rtlCol="0" anchor="ctr"/>
+          <a:lstStyle/>
+          <a:p>
+            <a:pPr algn="ctr"/>
+            <a:endParaRPr lang="en-IN" dirty="0"/>
+          </a:p>
+        </p:txBody>
+      </p:sp>
+      <p:pic>
+        <p:nvPicPr>
+          <p:cNvPr id="9" name="Picture 8">
+            <a:extLst>
+              <a:ext uri="{FF2B5EF4-FFF2-40B4-BE49-F238E27FC236}">
+                <a16:creationId xmlns:a16="http://schemas.microsoft.com/office/drawing/2014/main" id="{078E475D-F2C0-4CDC-8E27-8EADE2E8CE95}"/>
+              </a:ext>
+            </a:extLst>
+          </p:cNvPr>
+          <p:cNvPicPr>
+            <a:picLocks noChangeAspect="1"/>
+          </p:cNvPicPr>
+          <p:nvPr/>
+        </p:nvPicPr>
+        <p:blipFill>
+          <a:blip r:embed="rId2">
+            <a:extLst>
+              <a:ext uri="{BEBA8EAE-BF5A-486C-A8C5-ECC9F3942E4B}">
+                <a14:imgProps xmlns:a14="http://schemas.microsoft.com/office/drawing/2010/main">
+                  <a14:imgLayer r:embed="rId3">
+                    <a14:imgEffect>
+                      <a14:sharpenSoften amount="-50000"/>
+                    </a14:imgEffect>
+                    <a14:imgEffect>
+                      <a14:saturation sat="33000"/>
+                    </a14:imgEffect>
+                    <a14:imgEffect>
+                      <a14:brightnessContrast bright="-20000" contrast="40000"/>
+                    </a14:imgEffect>
+                  </a14:imgLayer>
+                </a14:imgProps>
+              </a:ext>
+              <a:ext uri="{28A0092B-C50C-407E-A947-70E740481C1C}">
+                <a14:useLocalDpi xmlns:a14="http://schemas.microsoft.com/office/drawing/2010/main" val="0"/>
+              </a:ext>
+            </a:extLst>
+          </a:blip>
+          <a:stretch>
+            <a:fillRect/>
+          </a:stretch>
+        </p:blipFill>
+        <p:spPr>
+          <a:xfrm>
+            <a:off x="-7327" y="-325464"/>
+            <a:ext cx="12199327" cy="2727702"/>
+          </a:xfrm>
+          <a:prstGeom prst="rect">
+            <a:avLst/>
+          </a:prstGeom>
+        </p:spPr>
+      </p:pic>
+      <p:sp>
+        <p:nvSpPr>
+          <p:cNvPr id="7" name="TextBox 6">
+            <a:extLst>
+              <a:ext uri="{FF2B5EF4-FFF2-40B4-BE49-F238E27FC236}">
+                <a16:creationId xmlns:a16="http://schemas.microsoft.com/office/drawing/2014/main" id="{33B558FE-2D57-4B03-8FD7-D159F0FEB500}"/>
+              </a:ext>
+            </a:extLst>
+          </p:cNvPr>
+          <p:cNvSpPr txBox="1"/>
+          <p:nvPr/>
+        </p:nvSpPr>
+        <p:spPr>
+          <a:xfrm>
+            <a:off x="204527" y="447941"/>
+            <a:ext cx="5737860" cy="1754326"/>
+          </a:xfrm>
+          <a:prstGeom prst="rect">
+            <a:avLst/>
+          </a:prstGeom>
+          <a:noFill/>
+        </p:spPr>
+        <p:txBody>
+          <a:bodyPr wrap="square" rtlCol="0">
+            <a:spAutoFit/>
+          </a:bodyPr>
+          <a:lstStyle/>
+          <a:p>
+            <a:r>
+              <a:rPr lang="en-US" sz="5400" b="1" dirty="0">
+                <a:solidFill>
+                  <a:schemeClr val="bg1"/>
+                </a:solidFill>
+              </a:rPr>
+              <a:t>WHY </a:t>
+            </a:r>
+            <a:r>
+              <a:rPr lang="en-US" sz="5400" b="1" dirty="0">
+                <a:solidFill>
+                  <a:schemeClr val="accent4"/>
+                </a:solidFill>
+              </a:rPr>
+              <a:t>ABSTRACT</a:t>
+            </a:r>
+          </a:p>
+          <a:p>
+            <a:r>
+              <a:rPr lang="en-US" sz="5400" b="1" dirty="0">
+                <a:solidFill>
+                  <a:schemeClr val="accent4"/>
+                </a:solidFill>
+              </a:rPr>
+              <a:t>DATA </a:t>
+            </a:r>
+            <a:r>
+              <a:rPr lang="en-US" sz="5400" b="1" dirty="0">
+                <a:solidFill>
+                  <a:schemeClr val="bg1"/>
+                </a:solidFill>
+              </a:rPr>
+              <a:t>TYPES?</a:t>
+            </a:r>
+            <a:endParaRPr lang="en-IN" sz="5400" b="1" dirty="0">
+              <a:solidFill>
+                <a:schemeClr val="bg1"/>
+              </a:solidFill>
+            </a:endParaRPr>
+          </a:p>
+        </p:txBody>
+      </p:sp>
+      <p:sp>
+        <p:nvSpPr>
+          <p:cNvPr id="10" name="Rectangle 9">
+            <a:extLst>
+              <a:ext uri="{FF2B5EF4-FFF2-40B4-BE49-F238E27FC236}">
+                <a16:creationId xmlns:a16="http://schemas.microsoft.com/office/drawing/2014/main" id="{35FE670A-DD3B-48E0-88CA-813329075394}"/>
+              </a:ext>
+            </a:extLst>
+          </p:cNvPr>
+          <p:cNvSpPr/>
+          <p:nvPr/>
+        </p:nvSpPr>
+        <p:spPr>
+          <a:xfrm>
+            <a:off x="-775088" y="6619164"/>
+            <a:ext cx="15449030" cy="562679"/>
+          </a:xfrm>
+          <a:prstGeom prst="rect">
+            <a:avLst/>
+          </a:prstGeom>
+          <a:solidFill>
+            <a:schemeClr val="accent5"/>
+          </a:solidFill>
+          <a:ln>
+            <a:noFill/>
+          </a:ln>
+        </p:spPr>
+        <p:style>
+          <a:lnRef idx="2">
+            <a:schemeClr val="accent1">
+              <a:shade val="50000"/>
+            </a:schemeClr>
+          </a:lnRef>
+          <a:fillRef idx="1">
+            <a:schemeClr val="accent1"/>
+          </a:fillRef>
+          <a:effectRef idx="0">
+            <a:schemeClr val="accent1"/>
+          </a:effectRef>
+          <a:fontRef idx="minor">
+            <a:schemeClr val="lt1"/>
+          </a:fontRef>
+        </p:style>
+        <p:txBody>
+          <a:bodyPr rtlCol="0" anchor="ctr"/>
+          <a:lstStyle/>
+          <a:p>
+            <a:pPr algn="ctr"/>
+            <a:endParaRPr lang="en-IN"/>
+          </a:p>
+        </p:txBody>
+      </p:sp>
+      <p:sp>
+        <p:nvSpPr>
+          <p:cNvPr id="11" name="Rectangle 10">
+            <a:extLst>
+              <a:ext uri="{FF2B5EF4-FFF2-40B4-BE49-F238E27FC236}">
+                <a16:creationId xmlns:a16="http://schemas.microsoft.com/office/drawing/2014/main" id="{0B326606-E6B3-472F-AD36-B41B29DD5BA8}"/>
+              </a:ext>
+            </a:extLst>
+          </p:cNvPr>
+          <p:cNvSpPr/>
+          <p:nvPr/>
+        </p:nvSpPr>
+        <p:spPr>
+          <a:xfrm>
+            <a:off x="6264322" y="6619164"/>
+            <a:ext cx="8779741" cy="562683"/>
+          </a:xfrm>
+          <a:prstGeom prst="rect">
+            <a:avLst/>
+          </a:prstGeom>
+          <a:solidFill>
+            <a:srgbClr val="29679F"/>
+          </a:solidFill>
+          <a:ln>
+            <a:noFill/>
+          </a:ln>
+        </p:spPr>
+        <p:style>
+          <a:lnRef idx="2">
+            <a:schemeClr val="accent1">
+              <a:shade val="50000"/>
+            </a:schemeClr>
+          </a:lnRef>
+          <a:fillRef idx="1">
+            <a:schemeClr val="accent1"/>
+          </a:fillRef>
+          <a:effectRef idx="0">
+            <a:schemeClr val="accent1"/>
+          </a:effectRef>
+          <a:fontRef idx="minor">
+            <a:schemeClr val="lt1"/>
+          </a:fontRef>
+        </p:style>
+        <p:txBody>
+          <a:bodyPr rtlCol="0" anchor="ctr"/>
+          <a:lstStyle/>
+          <a:p>
+            <a:pPr algn="ctr"/>
+            <a:endParaRPr lang="en-IN"/>
+          </a:p>
+        </p:txBody>
+      </p:sp>
+      <p:sp>
+        <p:nvSpPr>
+          <p:cNvPr id="4" name="TextBox 3">
+            <a:extLst>
+              <a:ext uri="{FF2B5EF4-FFF2-40B4-BE49-F238E27FC236}">
+                <a16:creationId xmlns:a16="http://schemas.microsoft.com/office/drawing/2014/main" id="{C503C0D1-69AD-46F6-8103-3C748DA10457}"/>
+              </a:ext>
+            </a:extLst>
+          </p:cNvPr>
+          <p:cNvSpPr txBox="1"/>
+          <p:nvPr/>
+        </p:nvSpPr>
+        <p:spPr>
+          <a:xfrm>
+            <a:off x="170484" y="2510431"/>
+            <a:ext cx="5422829" cy="3908762"/>
+          </a:xfrm>
+          <a:prstGeom prst="rect">
+            <a:avLst/>
+          </a:prstGeom>
+          <a:noFill/>
+        </p:spPr>
+        <p:txBody>
+          <a:bodyPr wrap="square" rtlCol="0">
+            <a:spAutoFit/>
+          </a:bodyPr>
+          <a:lstStyle/>
+          <a:p>
+            <a:pPr marL="342900" indent="-342900" algn="just">
+              <a:buFont typeface="Wingdings" panose="05000000000000000000" pitchFamily="2" charset="2"/>
+              <a:buChar char="§"/>
+            </a:pPr>
+            <a:r>
+              <a:rPr lang="en-US" sz="2000" dirty="0"/>
+              <a:t>User of the ADT </a:t>
+            </a:r>
+            <a:r>
+              <a:rPr lang="en-US" sz="2000" b="1" dirty="0">
+                <a:solidFill>
+                  <a:schemeClr val="accent5">
+                    <a:lumMod val="75000"/>
+                  </a:schemeClr>
+                </a:solidFill>
+              </a:rPr>
+              <a:t>“sees” </a:t>
+            </a:r>
+            <a:r>
+              <a:rPr lang="en-US" sz="2000" dirty="0"/>
+              <a:t>only the interface to the objects; the implementation details are “hidden” in the definition of the ADT</a:t>
+            </a:r>
+          </a:p>
+          <a:p>
+            <a:pPr marL="285750" indent="-285750" algn="just">
+              <a:buFont typeface="Wingdings" panose="05000000000000000000" pitchFamily="2" charset="2"/>
+              <a:buChar char="§"/>
+            </a:pPr>
+            <a:endParaRPr lang="en-US" sz="1400" dirty="0"/>
+          </a:p>
+          <a:p>
+            <a:pPr marL="342900" indent="-342900" algn="just">
+              <a:buFont typeface="Wingdings" panose="05000000000000000000" pitchFamily="2" charset="2"/>
+              <a:buChar char="§"/>
+            </a:pPr>
+            <a:r>
+              <a:rPr lang="en-US" sz="2000" dirty="0"/>
+              <a:t>The user constrained to manipulate the object solely through the </a:t>
+            </a:r>
+            <a:r>
+              <a:rPr lang="en-US" sz="2000" b="1" dirty="0">
+                <a:solidFill>
+                  <a:schemeClr val="accent5">
+                    <a:lumMod val="75000"/>
+                  </a:schemeClr>
+                </a:solidFill>
+              </a:rPr>
+              <a:t>functions (operations) </a:t>
+            </a:r>
+            <a:r>
+              <a:rPr lang="en-US" sz="2000" dirty="0"/>
+              <a:t>that are provided</a:t>
+            </a:r>
+          </a:p>
+          <a:p>
+            <a:pPr marL="285750" indent="-285750" algn="just">
+              <a:buFont typeface="Wingdings" panose="05000000000000000000" pitchFamily="2" charset="2"/>
+              <a:buChar char="§"/>
+            </a:pPr>
+            <a:endParaRPr lang="en-US" sz="1400" dirty="0"/>
+          </a:p>
+          <a:p>
+            <a:pPr marL="342900" indent="-342900" algn="just">
+              <a:buFont typeface="Wingdings" panose="05000000000000000000" pitchFamily="2" charset="2"/>
+              <a:buChar char="§"/>
+            </a:pPr>
+            <a:r>
+              <a:rPr lang="en-US" sz="2000" dirty="0"/>
+              <a:t>The designers may still alter the representation as long as the </a:t>
+            </a:r>
+            <a:r>
+              <a:rPr lang="en-US" sz="2000" b="1" dirty="0">
+                <a:solidFill>
+                  <a:schemeClr val="accent5">
+                    <a:lumMod val="75000"/>
+                  </a:schemeClr>
+                </a:solidFill>
+              </a:rPr>
+              <a:t>new implementations </a:t>
+            </a:r>
+            <a:r>
+              <a:rPr lang="en-US" sz="2000" dirty="0"/>
+              <a:t>of the operations do not change the user interface. This means that users will not have to recode their algorithms.</a:t>
+            </a:r>
+            <a:endParaRPr lang="en-IN" sz="2000" dirty="0"/>
+          </a:p>
+        </p:txBody>
+      </p:sp>
+      <p:pic>
+        <p:nvPicPr>
+          <p:cNvPr id="7170" name="Picture 2" descr="Abstract Data Types (ADT) - ppt download">
+            <a:extLst>
+              <a:ext uri="{FF2B5EF4-FFF2-40B4-BE49-F238E27FC236}">
+                <a16:creationId xmlns:a16="http://schemas.microsoft.com/office/drawing/2014/main" id="{820A2A29-EC22-44CF-9E1A-49BF2F6BF593}"/>
+              </a:ext>
+            </a:extLst>
+          </p:cNvPr>
+          <p:cNvPicPr>
+            <a:picLocks noChangeAspect="1" noChangeArrowheads="1"/>
+          </p:cNvPicPr>
+          <p:nvPr/>
+        </p:nvPicPr>
+        <p:blipFill rotWithShape="1">
+          <a:blip r:embed="rId4">
+            <a:extLst>
+              <a:ext uri="{28A0092B-C50C-407E-A947-70E740481C1C}">
+                <a14:useLocalDpi xmlns:a14="http://schemas.microsoft.com/office/drawing/2010/main" val="0"/>
+              </a:ext>
+            </a:extLst>
+          </a:blip>
+          <a:srcRect l="4520" t="20791" r="3983" b="3483"/>
+          <a:stretch/>
+        </p:blipFill>
+        <p:spPr bwMode="auto">
+          <a:xfrm>
+            <a:off x="5994781" y="1084881"/>
+            <a:ext cx="5865276" cy="4060555"/>
+          </a:xfrm>
+          <a:prstGeom prst="rect">
+            <a:avLst/>
+          </a:prstGeom>
+          <a:ln>
+            <a:noFill/>
+          </a:ln>
+          <a:effectLst>
+            <a:outerShdw blurRad="190500" algn="tl" rotWithShape="0">
+              <a:srgbClr val="000000">
+                <a:alpha val="70000"/>
+              </a:srgbClr>
+            </a:outerShdw>
+          </a:effectLst>
+          <a:extLst>
+            <a:ext uri="{909E8E84-426E-40DD-AFC4-6F175D3DCCD1}">
+              <a14:hiddenFill xmlns:a14="http://schemas.microsoft.com/office/drawing/2010/main">
+                <a:solidFill>
+                  <a:srgbClr val="FFFFFF"/>
+                </a:solidFill>
+              </a14:hiddenFill>
+            </a:ext>
+          </a:extLst>
+        </p:spPr>
+      </p:pic>
+    </p:spTree>
+    <p:extLst>
+      <p:ext uri="{BB962C8B-B14F-4D97-AF65-F5344CB8AC3E}">
+        <p14:creationId xmlns:p14="http://schemas.microsoft.com/office/powerpoint/2010/main" val="4291146465"/>
+      </p:ext>
+    </p:extLst>
+  </p:cSld>
+  <p:clrMapOvr>
+    <a:masterClrMapping/>
+  </p:clrMapOvr>
+  <p:transition spd="med">
+    <p:pull/>
+  </p:transition>
+</p:sld>
+</file>
+
+<file path=ppt/slides/slide11.xml><?xml version="1.0" encoding="utf-8"?>
+<p:sld xmlns:a="http://schemas.openxmlformats.org/drawingml/2006/main" xmlns:r="http://schemas.openxmlformats.org/officeDocument/2006/relationships" xmlns:p="http://schemas.openxmlformats.org/presentationml/2006/main">
+  <p:cSld>
+    <p:spTree>
+      <p:nvGrpSpPr>
+        <p:cNvPr id="1" name=""/>
+        <p:cNvGrpSpPr/>
+        <p:nvPr/>
+      </p:nvGrpSpPr>
+      <p:grpSpPr>
+        <a:xfrm>
+          <a:off x="0" y="0"/>
+          <a:ext cx="0" cy="0"/>
+          <a:chOff x="0" y="0"/>
+          <a:chExt cx="0" cy="0"/>
+        </a:xfrm>
+      </p:grpSpPr>
+      <p:sp>
+        <p:nvSpPr>
+          <p:cNvPr id="8" name="Rectangle 7">
+            <a:extLst>
+              <a:ext uri="{FF2B5EF4-FFF2-40B4-BE49-F238E27FC236}">
+                <a16:creationId xmlns:a16="http://schemas.microsoft.com/office/drawing/2014/main" id="{02166B14-BA41-4A9E-ACC7-E14040318AD5}"/>
+              </a:ext>
+            </a:extLst>
+          </p:cNvPr>
+          <p:cNvSpPr/>
+          <p:nvPr/>
+        </p:nvSpPr>
+        <p:spPr>
+          <a:xfrm>
+            <a:off x="0" y="-1"/>
+            <a:ext cx="12192000" cy="1503337"/>
+          </a:xfrm>
+          <a:prstGeom prst="rect">
+            <a:avLst/>
+          </a:prstGeom>
+          <a:solidFill>
+            <a:srgbClr val="323C4D"/>
+          </a:solidFill>
+          <a:ln>
+            <a:noFill/>
+          </a:ln>
+        </p:spPr>
+        <p:style>
+          <a:lnRef idx="2">
+            <a:schemeClr val="accent1">
+              <a:shade val="50000"/>
+            </a:schemeClr>
+          </a:lnRef>
+          <a:fillRef idx="1">
+            <a:schemeClr val="accent1"/>
+          </a:fillRef>
+          <a:effectRef idx="0">
+            <a:schemeClr val="accent1"/>
+          </a:effectRef>
+          <a:fontRef idx="minor">
+            <a:schemeClr val="lt1"/>
+          </a:fontRef>
+        </p:style>
+        <p:txBody>
+          <a:bodyPr rtlCol="0" anchor="ctr"/>
+          <a:lstStyle/>
+          <a:p>
+            <a:pPr algn="ctr"/>
+            <a:endParaRPr lang="en-IN" dirty="0"/>
+          </a:p>
+        </p:txBody>
+      </p:sp>
+      <p:pic>
+        <p:nvPicPr>
+          <p:cNvPr id="9" name="Picture 8">
+            <a:extLst>
+              <a:ext uri="{FF2B5EF4-FFF2-40B4-BE49-F238E27FC236}">
+                <a16:creationId xmlns:a16="http://schemas.microsoft.com/office/drawing/2014/main" id="{B8D0854E-269D-4B50-8F27-071151E2666D}"/>
+              </a:ext>
+            </a:extLst>
+          </p:cNvPr>
+          <p:cNvPicPr>
+            <a:picLocks noChangeAspect="1"/>
+          </p:cNvPicPr>
+          <p:nvPr/>
+        </p:nvPicPr>
+        <p:blipFill>
+          <a:blip r:embed="rId2">
+            <a:extLst>
+              <a:ext uri="{BEBA8EAE-BF5A-486C-A8C5-ECC9F3942E4B}">
+                <a14:imgProps xmlns:a14="http://schemas.microsoft.com/office/drawing/2010/main">
+                  <a14:imgLayer r:embed="rId3">
+                    <a14:imgEffect>
+                      <a14:sharpenSoften amount="-50000"/>
+                    </a14:imgEffect>
+                    <a14:imgEffect>
+                      <a14:saturation sat="33000"/>
+                    </a14:imgEffect>
+                    <a14:imgEffect>
+                      <a14:brightnessContrast bright="-20000" contrast="40000"/>
+                    </a14:imgEffect>
+                  </a14:imgLayer>
+                </a14:imgProps>
+              </a:ext>
+              <a:ext uri="{28A0092B-C50C-407E-A947-70E740481C1C}">
+                <a14:useLocalDpi xmlns:a14="http://schemas.microsoft.com/office/drawing/2010/main" val="0"/>
+              </a:ext>
+            </a:extLst>
+          </a:blip>
+          <a:stretch>
+            <a:fillRect/>
+          </a:stretch>
+        </p:blipFill>
+        <p:spPr>
+          <a:xfrm>
+            <a:off x="-7327" y="-542441"/>
+            <a:ext cx="12199327" cy="2045777"/>
+          </a:xfrm>
+          <a:prstGeom prst="rect">
+            <a:avLst/>
+          </a:prstGeom>
+        </p:spPr>
+      </p:pic>
+      <p:pic>
+        <p:nvPicPr>
+          <p:cNvPr id="8194" name="Picture 2" descr="218 3d Business Man Character Flying Stock Photos, Pictures &amp;amp; Royalty-Free  Images - iStock">
+            <a:extLst>
+              <a:ext uri="{FF2B5EF4-FFF2-40B4-BE49-F238E27FC236}">
+                <a16:creationId xmlns:a16="http://schemas.microsoft.com/office/drawing/2014/main" id="{4B2C66A5-1D14-4492-AD45-AF35E8990DC3}"/>
+              </a:ext>
+            </a:extLst>
+          </p:cNvPr>
+          <p:cNvPicPr>
+            <a:picLocks noChangeAspect="1" noChangeArrowheads="1"/>
+          </p:cNvPicPr>
+          <p:nvPr/>
+        </p:nvPicPr>
+        <p:blipFill>
+          <a:blip r:embed="rId4">
+            <a:extLst>
+              <a:ext uri="{28A0092B-C50C-407E-A947-70E740481C1C}">
+                <a14:useLocalDpi xmlns:a14="http://schemas.microsoft.com/office/drawing/2010/main" val="0"/>
+              </a:ext>
+            </a:extLst>
+          </a:blip>
+          <a:srcRect/>
+          <a:stretch>
+            <a:fillRect/>
+          </a:stretch>
+        </p:blipFill>
+        <p:spPr bwMode="auto">
+          <a:xfrm>
+            <a:off x="8387166" y="3053166"/>
+            <a:ext cx="3804834" cy="3804834"/>
+          </a:xfrm>
+          <a:prstGeom prst="rect">
+            <a:avLst/>
+          </a:prstGeom>
+          <a:noFill/>
+          <a:extLst>
+            <a:ext uri="{909E8E84-426E-40DD-AFC4-6F175D3DCCD1}">
+              <a14:hiddenFill xmlns:a14="http://schemas.microsoft.com/office/drawing/2010/main">
+                <a:solidFill>
+                  <a:srgbClr val="FFFFFF"/>
+                </a:solidFill>
+              </a14:hiddenFill>
+            </a:ext>
+          </a:extLst>
+        </p:spPr>
+      </p:pic>
+      <p:sp>
+        <p:nvSpPr>
+          <p:cNvPr id="7" name="TextBox 6">
+            <a:extLst>
+              <a:ext uri="{FF2B5EF4-FFF2-40B4-BE49-F238E27FC236}">
+                <a16:creationId xmlns:a16="http://schemas.microsoft.com/office/drawing/2014/main" id="{33B558FE-2D57-4B03-8FD7-D159F0FEB500}"/>
+              </a:ext>
+            </a:extLst>
+          </p:cNvPr>
+          <p:cNvSpPr txBox="1"/>
+          <p:nvPr/>
+        </p:nvSpPr>
+        <p:spPr>
+          <a:xfrm>
+            <a:off x="526462" y="412790"/>
+            <a:ext cx="5737860" cy="830997"/>
+          </a:xfrm>
+          <a:prstGeom prst="rect">
+            <a:avLst/>
+          </a:prstGeom>
+          <a:noFill/>
+        </p:spPr>
+        <p:txBody>
+          <a:bodyPr wrap="square" rtlCol="0">
+            <a:spAutoFit/>
+          </a:bodyPr>
+          <a:lstStyle/>
+          <a:p>
+            <a:r>
+              <a:rPr lang="en-US" sz="4800" b="1" dirty="0">
+                <a:solidFill>
+                  <a:schemeClr val="bg1"/>
+                </a:solidFill>
+              </a:rPr>
+              <a:t>BIBLIOGRAPHY</a:t>
+            </a:r>
+            <a:endParaRPr lang="en-IN" sz="4800" b="1" dirty="0">
+              <a:solidFill>
+                <a:schemeClr val="bg1"/>
+              </a:solidFill>
+            </a:endParaRPr>
+          </a:p>
+        </p:txBody>
+      </p:sp>
+      <p:sp>
+        <p:nvSpPr>
+          <p:cNvPr id="10" name="Rectangle 9">
+            <a:extLst>
+              <a:ext uri="{FF2B5EF4-FFF2-40B4-BE49-F238E27FC236}">
+                <a16:creationId xmlns:a16="http://schemas.microsoft.com/office/drawing/2014/main" id="{35FE670A-DD3B-48E0-88CA-813329075394}"/>
+              </a:ext>
+            </a:extLst>
+          </p:cNvPr>
+          <p:cNvSpPr/>
+          <p:nvPr/>
+        </p:nvSpPr>
+        <p:spPr>
+          <a:xfrm>
+            <a:off x="-775088" y="6619164"/>
+            <a:ext cx="15449030" cy="562679"/>
+          </a:xfrm>
+          <a:prstGeom prst="rect">
+            <a:avLst/>
+          </a:prstGeom>
+          <a:solidFill>
+            <a:schemeClr val="accent5"/>
+          </a:solidFill>
+          <a:ln>
+            <a:noFill/>
+          </a:ln>
+        </p:spPr>
+        <p:style>
+          <a:lnRef idx="2">
+            <a:schemeClr val="accent1">
+              <a:shade val="50000"/>
+            </a:schemeClr>
+          </a:lnRef>
+          <a:fillRef idx="1">
+            <a:schemeClr val="accent1"/>
+          </a:fillRef>
+          <a:effectRef idx="0">
+            <a:schemeClr val="accent1"/>
+          </a:effectRef>
+          <a:fontRef idx="minor">
+            <a:schemeClr val="lt1"/>
+          </a:fontRef>
+        </p:style>
+        <p:txBody>
+          <a:bodyPr rtlCol="0" anchor="ctr"/>
+          <a:lstStyle/>
+          <a:p>
+            <a:pPr algn="ctr"/>
+            <a:endParaRPr lang="en-IN"/>
+          </a:p>
+        </p:txBody>
+      </p:sp>
+      <p:sp>
+        <p:nvSpPr>
+          <p:cNvPr id="11" name="Rectangle 10">
+            <a:extLst>
+              <a:ext uri="{FF2B5EF4-FFF2-40B4-BE49-F238E27FC236}">
+                <a16:creationId xmlns:a16="http://schemas.microsoft.com/office/drawing/2014/main" id="{0B326606-E6B3-472F-AD36-B41B29DD5BA8}"/>
+              </a:ext>
+            </a:extLst>
+          </p:cNvPr>
+          <p:cNvSpPr/>
+          <p:nvPr/>
+        </p:nvSpPr>
+        <p:spPr>
+          <a:xfrm>
+            <a:off x="6264322" y="6619164"/>
+            <a:ext cx="8779741" cy="562683"/>
+          </a:xfrm>
+          <a:prstGeom prst="rect">
+            <a:avLst/>
+          </a:prstGeom>
+          <a:solidFill>
+            <a:srgbClr val="29679F"/>
+          </a:solidFill>
+          <a:ln>
+            <a:noFill/>
+          </a:ln>
+        </p:spPr>
+        <p:style>
+          <a:lnRef idx="2">
+            <a:schemeClr val="accent1">
+              <a:shade val="50000"/>
+            </a:schemeClr>
+          </a:lnRef>
+          <a:fillRef idx="1">
+            <a:schemeClr val="accent1"/>
+          </a:fillRef>
+          <a:effectRef idx="0">
+            <a:schemeClr val="accent1"/>
+          </a:effectRef>
+          <a:fontRef idx="minor">
+            <a:schemeClr val="lt1"/>
+          </a:fontRef>
+        </p:style>
+        <p:txBody>
+          <a:bodyPr rtlCol="0" anchor="ctr"/>
+          <a:lstStyle/>
+          <a:p>
+            <a:pPr algn="ctr"/>
+            <a:endParaRPr lang="en-IN"/>
+          </a:p>
+        </p:txBody>
+      </p:sp>
+      <p:sp>
+        <p:nvSpPr>
+          <p:cNvPr id="2" name="TextBox 1">
+            <a:extLst>
+              <a:ext uri="{FF2B5EF4-FFF2-40B4-BE49-F238E27FC236}">
+                <a16:creationId xmlns:a16="http://schemas.microsoft.com/office/drawing/2014/main" id="{C9EDE4A2-E625-4697-9062-6401CE8A05B2}"/>
+              </a:ext>
+            </a:extLst>
+          </p:cNvPr>
+          <p:cNvSpPr txBox="1"/>
+          <p:nvPr/>
+        </p:nvSpPr>
+        <p:spPr>
+          <a:xfrm>
+            <a:off x="571502" y="2063206"/>
+            <a:ext cx="8477572" cy="3539430"/>
+          </a:xfrm>
+          <a:prstGeom prst="rect">
+            <a:avLst/>
+          </a:prstGeom>
+          <a:noFill/>
+        </p:spPr>
+        <p:txBody>
+          <a:bodyPr wrap="square" rtlCol="0">
+            <a:spAutoFit/>
+          </a:bodyPr>
+          <a:lstStyle/>
+          <a:p>
+            <a:pPr marL="514350" indent="-514350">
+              <a:buFont typeface="Wingdings" panose="05000000000000000000" pitchFamily="2" charset="2"/>
+              <a:buChar char="§"/>
+            </a:pPr>
+            <a:r>
+              <a:rPr lang="en-IN" sz="2800" dirty="0">
+                <a:hlinkClick r:id="rId5"/>
+              </a:rPr>
+              <a:t>https://techvidvan.com/tutorials/java-abstract-data-type/</a:t>
+            </a:r>
+            <a:endParaRPr lang="en-IN" sz="2800" dirty="0"/>
+          </a:p>
+          <a:p>
+            <a:pPr marL="514350" indent="-514350">
+              <a:buFont typeface="Wingdings" panose="05000000000000000000" pitchFamily="2" charset="2"/>
+              <a:buChar char="§"/>
+            </a:pPr>
+            <a:endParaRPr lang="en-US" sz="2800" dirty="0"/>
+          </a:p>
+          <a:p>
+            <a:pPr marL="514350" indent="-514350">
+              <a:buFont typeface="Wingdings" panose="05000000000000000000" pitchFamily="2" charset="2"/>
+              <a:buChar char="§"/>
+            </a:pPr>
+            <a:r>
+              <a:rPr lang="en-IN" sz="2800" dirty="0">
+                <a:hlinkClick r:id="rId6"/>
+              </a:rPr>
+              <a:t>https://www.geeksforgeeks.org/abstract-data-types/</a:t>
+            </a:r>
+            <a:endParaRPr lang="en-IN" sz="2800" dirty="0"/>
+          </a:p>
+          <a:p>
+            <a:pPr marL="514350" indent="-514350">
+              <a:buFont typeface="Wingdings" panose="05000000000000000000" pitchFamily="2" charset="2"/>
+              <a:buChar char="§"/>
+            </a:pPr>
+            <a:endParaRPr lang="en-US" sz="2800" dirty="0"/>
+          </a:p>
+          <a:p>
+            <a:pPr marL="514350" indent="-514350">
+              <a:buFont typeface="Wingdings" panose="05000000000000000000" pitchFamily="2" charset="2"/>
+              <a:buChar char="§"/>
+            </a:pPr>
+            <a:r>
+              <a:rPr lang="en-IN" sz="2800" dirty="0">
+                <a:hlinkClick r:id="rId7"/>
+              </a:rPr>
+              <a:t>https://stackoverflow.com/questions/10267084/what-is-adt-abstract-data-type</a:t>
+            </a:r>
+            <a:endParaRPr lang="en-IN" sz="2800" dirty="0"/>
+          </a:p>
+          <a:p>
+            <a:pPr marL="514350" indent="-514350">
+              <a:buFont typeface="Wingdings" panose="05000000000000000000" pitchFamily="2" charset="2"/>
+              <a:buChar char="§"/>
+            </a:pPr>
+            <a:endParaRPr lang="en-IN" sz="2800" dirty="0"/>
+          </a:p>
+        </p:txBody>
+      </p:sp>
+    </p:spTree>
+    <p:extLst>
+      <p:ext uri="{BB962C8B-B14F-4D97-AF65-F5344CB8AC3E}">
+        <p14:creationId xmlns:p14="http://schemas.microsoft.com/office/powerpoint/2010/main" val="3104166911"/>
+      </p:ext>
+    </p:extLst>
+  </p:cSld>
+  <p:clrMapOvr>
+    <a:masterClrMapping/>
+  </p:clrMapOvr>
+  <mc:AlternateContent xmlns:mc="http://schemas.openxmlformats.org/markup-compatibility/2006">
+    <mc:Choice xmlns:p14="http://schemas.microsoft.com/office/powerpoint/2010/main" Requires="p14">
+      <p:transition spd="slow" p14:dur="1300">
+        <p14:pan dir="u"/>
+      </p:transition>
+    </mc:Choice>
+    <mc:Fallback>
+      <p:transition spd="slow">
+        <p:fade/>
+      </p:transition>
+    </mc:Fallback>
+  </mc:AlternateContent>
+</p:sld>
+</file>
+
+<file path=ppt/slides/slide12.xml><?xml version="1.0" encoding="utf-8"?>
+<p:sld xmlns:a="http://schemas.openxmlformats.org/drawingml/2006/main" xmlns:r="http://schemas.openxmlformats.org/officeDocument/2006/relationships" xmlns:p="http://schemas.openxmlformats.org/presentationml/2006/main">
+  <p:cSld>
+    <p:spTree>
+      <p:nvGrpSpPr>
+        <p:cNvPr id="1" name=""/>
+        <p:cNvGrpSpPr/>
+        <p:nvPr/>
+      </p:nvGrpSpPr>
+      <p:grpSpPr>
+        <a:xfrm>
+          <a:off x="0" y="0"/>
+          <a:ext cx="0" cy="0"/>
+          <a:chOff x="0" y="0"/>
+          <a:chExt cx="0" cy="0"/>
+        </a:xfrm>
+      </p:grpSpPr>
+      <p:pic>
+        <p:nvPicPr>
+          <p:cNvPr id="6146" name="Picture 2" descr="577 3d White Man Character And Business Graph Stock Photos, Pictures &amp;amp;  Royalty-Free Images - iStock">
+            <a:extLst>
+              <a:ext uri="{FF2B5EF4-FFF2-40B4-BE49-F238E27FC236}">
+                <a16:creationId xmlns:a16="http://schemas.microsoft.com/office/drawing/2014/main" id="{04A8E1E7-0C9A-4D12-9EBF-B97180D13880}"/>
+              </a:ext>
+            </a:extLst>
+          </p:cNvPr>
+          <p:cNvPicPr>
+            <a:picLocks noChangeAspect="1" noChangeArrowheads="1"/>
+          </p:cNvPicPr>
+          <p:nvPr/>
+        </p:nvPicPr>
+        <p:blipFill>
+          <a:blip r:embed="rId2">
+            <a:extLst>
+              <a:ext uri="{28A0092B-C50C-407E-A947-70E740481C1C}">
+                <a14:useLocalDpi xmlns:a14="http://schemas.microsoft.com/office/drawing/2010/main" val="0"/>
+              </a:ext>
+            </a:extLst>
+          </a:blip>
+          <a:srcRect/>
+          <a:stretch>
+            <a:fillRect/>
+          </a:stretch>
+        </p:blipFill>
+        <p:spPr bwMode="auto">
+          <a:xfrm>
+            <a:off x="5526695" y="-64770"/>
+            <a:ext cx="7383393" cy="6922770"/>
+          </a:xfrm>
+          <a:prstGeom prst="rect">
+            <a:avLst/>
+          </a:prstGeom>
+          <a:noFill/>
+          <a:extLst>
+            <a:ext uri="{909E8E84-426E-40DD-AFC4-6F175D3DCCD1}">
+              <a14:hiddenFill xmlns:a14="http://schemas.microsoft.com/office/drawing/2010/main">
+                <a:solidFill>
+                  <a:srgbClr val="FFFFFF"/>
+                </a:solidFill>
+              </a14:hiddenFill>
+            </a:ext>
+          </a:extLst>
+        </p:spPr>
+      </p:pic>
+      <p:pic>
+        <p:nvPicPr>
+          <p:cNvPr id="4" name="Picture 3">
+            <a:extLst>
+              <a:ext uri="{FF2B5EF4-FFF2-40B4-BE49-F238E27FC236}">
+                <a16:creationId xmlns:a16="http://schemas.microsoft.com/office/drawing/2014/main" id="{8FE969E3-9FEE-4BD3-AF4A-7A54C12A3D74}"/>
+              </a:ext>
+            </a:extLst>
+          </p:cNvPr>
+          <p:cNvPicPr>
+            <a:picLocks noChangeAspect="1"/>
+          </p:cNvPicPr>
+          <p:nvPr/>
+        </p:nvPicPr>
+        <p:blipFill rotWithShape="1">
+          <a:blip r:embed="rId3">
+            <a:extLst>
+              <a:ext uri="{28A0092B-C50C-407E-A947-70E740481C1C}">
+                <a14:useLocalDpi xmlns:a14="http://schemas.microsoft.com/office/drawing/2010/main" val="0"/>
+              </a:ext>
+            </a:extLst>
+          </a:blip>
+          <a:srcRect l="20667" t="14857" r="18772"/>
+          <a:stretch/>
+        </p:blipFill>
+        <p:spPr>
+          <a:xfrm>
+            <a:off x="6850251" y="3897815"/>
+            <a:ext cx="2123268" cy="1396679"/>
+          </a:xfrm>
+          <a:prstGeom prst="rect">
+            <a:avLst/>
+          </a:prstGeom>
+        </p:spPr>
+      </p:pic>
+      <p:sp>
+        <p:nvSpPr>
+          <p:cNvPr id="5" name="TextBox 4">
+            <a:extLst>
+              <a:ext uri="{FF2B5EF4-FFF2-40B4-BE49-F238E27FC236}">
+                <a16:creationId xmlns:a16="http://schemas.microsoft.com/office/drawing/2014/main" id="{9768D461-086E-4446-8F2A-CA0441D0018A}"/>
+              </a:ext>
+            </a:extLst>
+          </p:cNvPr>
+          <p:cNvSpPr txBox="1"/>
+          <p:nvPr/>
+        </p:nvSpPr>
+        <p:spPr>
+          <a:xfrm>
+            <a:off x="418456" y="2611785"/>
+            <a:ext cx="8159857" cy="1569660"/>
+          </a:xfrm>
+          <a:prstGeom prst="rect">
+            <a:avLst/>
+          </a:prstGeom>
+          <a:noFill/>
+        </p:spPr>
+        <p:txBody>
+          <a:bodyPr wrap="square" rtlCol="0">
+            <a:spAutoFit/>
+          </a:bodyPr>
+          <a:lstStyle/>
+          <a:p>
+            <a:r>
+              <a:rPr lang="en-US" sz="9600" b="1" dirty="0">
+                <a:solidFill>
+                  <a:schemeClr val="accent5">
+                    <a:lumMod val="75000"/>
+                  </a:schemeClr>
+                </a:solidFill>
+                <a:latin typeface="Brush Script MT" panose="03060802040406070304" pitchFamily="66" charset="0"/>
+              </a:rPr>
+              <a:t>Thank You..!</a:t>
+            </a:r>
+            <a:endParaRPr lang="en-IN" sz="9600" b="1" dirty="0">
+              <a:solidFill>
+                <a:schemeClr val="accent5">
+                  <a:lumMod val="75000"/>
+                </a:schemeClr>
+              </a:solidFill>
+              <a:latin typeface="Brush Script MT" panose="03060802040406070304" pitchFamily="66" charset="0"/>
+            </a:endParaRPr>
+          </a:p>
+        </p:txBody>
+      </p:sp>
+    </p:spTree>
+    <p:extLst>
+      <p:ext uri="{BB962C8B-B14F-4D97-AF65-F5344CB8AC3E}">
+        <p14:creationId xmlns:p14="http://schemas.microsoft.com/office/powerpoint/2010/main" val="1593714303"/>
+      </p:ext>
+    </p:extLst>
+  </p:cSld>
+  <p:clrMapOvr>
+    <a:masterClrMapping/>
+  </p:clrMapOvr>
+  <mc:AlternateContent xmlns:mc="http://schemas.openxmlformats.org/markup-compatibility/2006">
+    <mc:Choice xmlns:p14="http://schemas.microsoft.com/office/powerpoint/2010/main" Requires="p14">
+      <p:transition spd="slow" p14:dur="1200">
+        <p14:prism/>
+      </p:transition>
+    </mc:Choice>
+    <mc:Fallback>
+      <p:transition spd="slow">
+        <p:fade/>
+      </p:transition>
+    </mc:Fallback>
+  </mc:AlternateContent>
 </p:sld>
 </file>
 
@@ -3978,10 +5139,10 @@
       </p:grpSpPr>
       <p:sp>
         <p:nvSpPr>
-          <p:cNvPr id="11" name="Rectangle 10">
-            <a:extLst>
-              <a:ext uri="{FF2B5EF4-FFF2-40B4-BE49-F238E27FC236}">
-                <a16:creationId xmlns:a16="http://schemas.microsoft.com/office/drawing/2014/main" id="{CAECEF10-8B5B-432A-A219-34BAA1687BB0}"/>
+          <p:cNvPr id="8" name="Rectangle 7">
+            <a:extLst>
+              <a:ext uri="{FF2B5EF4-FFF2-40B4-BE49-F238E27FC236}">
+                <a16:creationId xmlns:a16="http://schemas.microsoft.com/office/drawing/2014/main" id="{9B4E212F-69E1-4220-8723-A9F33AD16C31}"/>
               </a:ext>
             </a:extLst>
           </p:cNvPr>
@@ -3990,14 +5151,14 @@
         </p:nvSpPr>
         <p:spPr>
           <a:xfrm>
-            <a:off x="-783773" y="1315648"/>
-            <a:ext cx="15457715" cy="461665"/>
+            <a:off x="-212035" y="-1"/>
+            <a:ext cx="12854609" cy="1078174"/>
           </a:xfrm>
           <a:prstGeom prst="rect">
             <a:avLst/>
           </a:prstGeom>
           <a:solidFill>
-            <a:schemeClr val="accent5"/>
+            <a:srgbClr val="323C4D"/>
           </a:solidFill>
           <a:ln>
             <a:noFill/>
@@ -4024,16 +5185,67 @@
           <a:lstStyle/>
           <a:p>
             <a:pPr algn="ctr"/>
-            <a:endParaRPr lang="en-IN"/>
-          </a:p>
-        </p:txBody>
-      </p:sp>
-      <p:sp>
-        <p:nvSpPr>
-          <p:cNvPr id="12" name="Rectangle 11">
-            <a:extLst>
-              <a:ext uri="{FF2B5EF4-FFF2-40B4-BE49-F238E27FC236}">
-                <a16:creationId xmlns:a16="http://schemas.microsoft.com/office/drawing/2014/main" id="{16D53D3D-B4C3-4CCB-AB7A-EF34F2E6EB83}"/>
+            <a:endParaRPr lang="en-IN" dirty="0"/>
+          </a:p>
+        </p:txBody>
+      </p:sp>
+      <p:pic>
+        <p:nvPicPr>
+          <p:cNvPr id="10" name="Picture 9">
+            <a:extLst>
+              <a:ext uri="{FF2B5EF4-FFF2-40B4-BE49-F238E27FC236}">
+                <a16:creationId xmlns:a16="http://schemas.microsoft.com/office/drawing/2014/main" id="{A8973F5D-A9C7-4748-9C9F-6DBACBEB90D2}"/>
+              </a:ext>
+            </a:extLst>
+          </p:cNvPr>
+          <p:cNvPicPr>
+            <a:picLocks noChangeAspect="1"/>
+          </p:cNvPicPr>
+          <p:nvPr/>
+        </p:nvPicPr>
+        <p:blipFill>
+          <a:blip r:embed="rId2">
+            <a:extLst>
+              <a:ext uri="{BEBA8EAE-BF5A-486C-A8C5-ECC9F3942E4B}">
+                <a14:imgProps xmlns:a14="http://schemas.microsoft.com/office/drawing/2010/main">
+                  <a14:imgLayer r:embed="rId3">
+                    <a14:imgEffect>
+                      <a14:sharpenSoften amount="-50000"/>
+                    </a14:imgEffect>
+                    <a14:imgEffect>
+                      <a14:saturation sat="33000"/>
+                    </a14:imgEffect>
+                    <a14:imgEffect>
+                      <a14:brightnessContrast bright="-20000" contrast="40000"/>
+                    </a14:imgEffect>
+                  </a14:imgLayer>
+                </a14:imgProps>
+              </a:ext>
+              <a:ext uri="{28A0092B-C50C-407E-A947-70E740481C1C}">
+                <a14:useLocalDpi xmlns:a14="http://schemas.microsoft.com/office/drawing/2010/main" val="0"/>
+              </a:ext>
+            </a:extLst>
+          </a:blip>
+          <a:stretch>
+            <a:fillRect/>
+          </a:stretch>
+        </p:blipFill>
+        <p:spPr>
+          <a:xfrm>
+            <a:off x="-7327" y="-1"/>
+            <a:ext cx="12199327" cy="1078174"/>
+          </a:xfrm>
+          <a:prstGeom prst="rect">
+            <a:avLst/>
+          </a:prstGeom>
+        </p:spPr>
+      </p:pic>
+      <p:sp>
+        <p:nvSpPr>
+          <p:cNvPr id="11" name="Rectangle 10">
+            <a:extLst>
+              <a:ext uri="{FF2B5EF4-FFF2-40B4-BE49-F238E27FC236}">
+                <a16:creationId xmlns:a16="http://schemas.microsoft.com/office/drawing/2014/main" id="{CAECEF10-8B5B-432A-A219-34BAA1687BB0}"/>
               </a:ext>
             </a:extLst>
           </p:cNvPr>
@@ -4042,14 +5254,14 @@
         </p:nvSpPr>
         <p:spPr>
           <a:xfrm>
-            <a:off x="6259386" y="1315649"/>
-            <a:ext cx="8784677" cy="461668"/>
+            <a:off x="-775088" y="6619164"/>
+            <a:ext cx="15449030" cy="562679"/>
           </a:xfrm>
           <a:prstGeom prst="rect">
             <a:avLst/>
           </a:prstGeom>
           <a:solidFill>
-            <a:srgbClr val="29679F"/>
+            <a:schemeClr val="accent5"/>
           </a:solidFill>
           <a:ln>
             <a:noFill/>
@@ -4082,10 +5294,10 @@
       </p:sp>
       <p:sp>
         <p:nvSpPr>
-          <p:cNvPr id="8" name="Rectangle 7">
-            <a:extLst>
-              <a:ext uri="{FF2B5EF4-FFF2-40B4-BE49-F238E27FC236}">
-                <a16:creationId xmlns:a16="http://schemas.microsoft.com/office/drawing/2014/main" id="{9B4E212F-69E1-4220-8723-A9F33AD16C31}"/>
+          <p:cNvPr id="12" name="Rectangle 11">
+            <a:extLst>
+              <a:ext uri="{FF2B5EF4-FFF2-40B4-BE49-F238E27FC236}">
+                <a16:creationId xmlns:a16="http://schemas.microsoft.com/office/drawing/2014/main" id="{16D53D3D-B4C3-4CCB-AB7A-EF34F2E6EB83}"/>
               </a:ext>
             </a:extLst>
           </p:cNvPr>
@@ -4094,14 +5306,14 @@
         </p:nvSpPr>
         <p:spPr>
           <a:xfrm>
-            <a:off x="-212035" y="-21771"/>
-            <a:ext cx="12854609" cy="1611086"/>
+            <a:off x="6264322" y="6619164"/>
+            <a:ext cx="8779741" cy="562683"/>
           </a:xfrm>
           <a:prstGeom prst="rect">
             <a:avLst/>
           </a:prstGeom>
           <a:solidFill>
-            <a:srgbClr val="323C4D"/>
+            <a:srgbClr val="29679F"/>
           </a:solidFill>
           <a:ln>
             <a:noFill/>
@@ -4128,7 +5340,242 @@
           <a:lstStyle/>
           <a:p>
             <a:pPr algn="ctr"/>
-            <a:endParaRPr lang="en-IN" dirty="0"/>
+            <a:endParaRPr lang="en-IN"/>
+          </a:p>
+        </p:txBody>
+      </p:sp>
+      <p:pic>
+        <p:nvPicPr>
+          <p:cNvPr id="3" name="Picture 2">
+            <a:extLst>
+              <a:ext uri="{FF2B5EF4-FFF2-40B4-BE49-F238E27FC236}">
+                <a16:creationId xmlns:a16="http://schemas.microsoft.com/office/drawing/2014/main" id="{216A1486-55BF-4111-9A4F-72EFCD3531F8}"/>
+              </a:ext>
+            </a:extLst>
+          </p:cNvPr>
+          <p:cNvPicPr>
+            <a:picLocks noChangeAspect="1"/>
+          </p:cNvPicPr>
+          <p:nvPr/>
+        </p:nvPicPr>
+        <p:blipFill>
+          <a:blip r:embed="rId4">
+            <a:extLst>
+              <a:ext uri="{BEBA8EAE-BF5A-486C-A8C5-ECC9F3942E4B}">
+                <a14:imgProps xmlns:a14="http://schemas.microsoft.com/office/drawing/2010/main">
+                  <a14:imgLayer r:embed="rId5">
+                    <a14:imgEffect>
+                      <a14:colorTemperature colorTemp="5900"/>
+                    </a14:imgEffect>
+                    <a14:imgEffect>
+                      <a14:saturation sat="400000"/>
+                    </a14:imgEffect>
+                  </a14:imgLayer>
+                </a14:imgProps>
+              </a:ext>
+              <a:ext uri="{28A0092B-C50C-407E-A947-70E740481C1C}">
+                <a14:useLocalDpi xmlns:a14="http://schemas.microsoft.com/office/drawing/2010/main" val="0"/>
+              </a:ext>
+            </a:extLst>
+          </a:blip>
+          <a:stretch>
+            <a:fillRect/>
+          </a:stretch>
+        </p:blipFill>
+        <p:spPr>
+          <a:xfrm>
+            <a:off x="7350370" y="1286549"/>
+            <a:ext cx="4527731" cy="4858603"/>
+          </a:xfrm>
+          <a:prstGeom prst="rect">
+            <a:avLst/>
+          </a:prstGeom>
+        </p:spPr>
+      </p:pic>
+      <p:sp>
+        <p:nvSpPr>
+          <p:cNvPr id="5" name="TextBox 4">
+            <a:extLst>
+              <a:ext uri="{FF2B5EF4-FFF2-40B4-BE49-F238E27FC236}">
+                <a16:creationId xmlns:a16="http://schemas.microsoft.com/office/drawing/2014/main" id="{ED029328-6A6B-49DF-B7BD-34E5790F6D7F}"/>
+              </a:ext>
+            </a:extLst>
+          </p:cNvPr>
+          <p:cNvSpPr txBox="1"/>
+          <p:nvPr/>
+        </p:nvSpPr>
+        <p:spPr>
+          <a:xfrm>
+            <a:off x="423081" y="245078"/>
+            <a:ext cx="9184943" cy="707886"/>
+          </a:xfrm>
+          <a:prstGeom prst="rect">
+            <a:avLst/>
+          </a:prstGeom>
+          <a:noFill/>
+        </p:spPr>
+        <p:txBody>
+          <a:bodyPr wrap="square" rtlCol="0">
+            <a:spAutoFit/>
+          </a:bodyPr>
+          <a:lstStyle/>
+          <a:p>
+            <a:r>
+              <a:rPr lang="en-US" sz="4000" b="1" dirty="0">
+                <a:solidFill>
+                  <a:schemeClr val="accent4"/>
+                </a:solidFill>
+              </a:rPr>
+              <a:t>ABSTRACT DATA TYPE(ADT)</a:t>
+            </a:r>
+            <a:endParaRPr lang="en-IN" sz="4000" b="1" dirty="0">
+              <a:solidFill>
+                <a:schemeClr val="accent4"/>
+              </a:solidFill>
+            </a:endParaRPr>
+          </a:p>
+        </p:txBody>
+      </p:sp>
+      <p:sp>
+        <p:nvSpPr>
+          <p:cNvPr id="6" name="TextBox 5">
+            <a:extLst>
+              <a:ext uri="{FF2B5EF4-FFF2-40B4-BE49-F238E27FC236}">
+                <a16:creationId xmlns:a16="http://schemas.microsoft.com/office/drawing/2014/main" id="{570AA2A4-3402-4779-BC58-23200BA8C5D4}"/>
+              </a:ext>
+            </a:extLst>
+          </p:cNvPr>
+          <p:cNvSpPr txBox="1"/>
+          <p:nvPr/>
+        </p:nvSpPr>
+        <p:spPr>
+          <a:xfrm>
+            <a:off x="313899" y="1357951"/>
+            <a:ext cx="6919414" cy="4832092"/>
+          </a:xfrm>
+          <a:prstGeom prst="rect">
+            <a:avLst/>
+          </a:prstGeom>
+          <a:noFill/>
+        </p:spPr>
+        <p:txBody>
+          <a:bodyPr wrap="square" rtlCol="0">
+            <a:spAutoFit/>
+          </a:bodyPr>
+          <a:lstStyle/>
+          <a:p>
+            <a:pPr marL="285750" indent="-285750">
+              <a:buFont typeface="Wingdings" panose="05000000000000000000" pitchFamily="2" charset="2"/>
+              <a:buChar char="§"/>
+            </a:pPr>
+            <a:r>
+              <a:rPr lang="en-US" sz="2200" dirty="0"/>
+              <a:t>To process data with a computer, we need to define the </a:t>
+            </a:r>
+            <a:r>
+              <a:rPr lang="en-US" sz="2200" b="1" dirty="0">
+                <a:solidFill>
+                  <a:schemeClr val="accent5">
+                    <a:lumMod val="75000"/>
+                  </a:schemeClr>
+                </a:solidFill>
+              </a:rPr>
+              <a:t>data type and the operation </a:t>
+            </a:r>
+            <a:r>
+              <a:rPr lang="en-US" sz="2200" dirty="0"/>
+              <a:t>to be performed on the data.</a:t>
+            </a:r>
+          </a:p>
+          <a:p>
+            <a:endParaRPr lang="en-US" sz="2200" dirty="0"/>
+          </a:p>
+          <a:p>
+            <a:pPr marL="285750" indent="-285750">
+              <a:buFont typeface="Wingdings" panose="05000000000000000000" pitchFamily="2" charset="2"/>
+              <a:buChar char="§"/>
+            </a:pPr>
+            <a:r>
+              <a:rPr lang="en-US" sz="2200" dirty="0"/>
+              <a:t>The definition of the data type and the definition of the operation to be applied to the data is part of the idea behind an </a:t>
+            </a:r>
+            <a:r>
+              <a:rPr lang="en-US" sz="2200" b="1" dirty="0">
+                <a:solidFill>
+                  <a:schemeClr val="accent5">
+                    <a:lumMod val="75000"/>
+                  </a:schemeClr>
+                </a:solidFill>
+              </a:rPr>
+              <a:t>abstract data type </a:t>
+            </a:r>
+            <a:r>
+              <a:rPr lang="en-US" sz="2200" dirty="0"/>
+              <a:t>(ADT)</a:t>
+            </a:r>
+          </a:p>
+          <a:p>
+            <a:pPr marL="285750" indent="-285750">
+              <a:buFont typeface="Wingdings" panose="05000000000000000000" pitchFamily="2" charset="2"/>
+              <a:buChar char="§"/>
+            </a:pPr>
+            <a:endParaRPr lang="en-US" sz="2200" dirty="0"/>
+          </a:p>
+          <a:p>
+            <a:pPr marL="285750" indent="-285750">
+              <a:buFont typeface="Wingdings" panose="05000000000000000000" pitchFamily="2" charset="2"/>
+              <a:buChar char="§"/>
+            </a:pPr>
+            <a:r>
+              <a:rPr lang="en-US" sz="2200" dirty="0"/>
+              <a:t>ADT means to hide how the </a:t>
+            </a:r>
+            <a:r>
+              <a:rPr lang="en-US" sz="2200" b="1" dirty="0">
+                <a:solidFill>
+                  <a:schemeClr val="accent5">
+                    <a:lumMod val="75000"/>
+                  </a:schemeClr>
+                </a:solidFill>
+              </a:rPr>
+              <a:t>operation is performed </a:t>
+            </a:r>
+            <a:r>
+              <a:rPr lang="en-US" sz="2200" dirty="0"/>
+              <a:t>on the data</a:t>
+            </a:r>
+          </a:p>
+          <a:p>
+            <a:pPr marL="285750" indent="-285750">
+              <a:buFont typeface="Wingdings" panose="05000000000000000000" pitchFamily="2" charset="2"/>
+              <a:buChar char="§"/>
+            </a:pPr>
+            <a:endParaRPr lang="en-US" sz="2200" dirty="0"/>
+          </a:p>
+          <a:p>
+            <a:pPr marL="285750" indent="-285750">
+              <a:buFont typeface="Wingdings" panose="05000000000000000000" pitchFamily="2" charset="2"/>
+              <a:buChar char="§"/>
+            </a:pPr>
+            <a:r>
+              <a:rPr lang="en-US" sz="2200" dirty="0"/>
+              <a:t>In other words, the user of an ADT needs only to know that a set of operations are available for the data type, but </a:t>
+            </a:r>
+            <a:r>
+              <a:rPr lang="en-US" sz="2200" b="1" dirty="0">
+                <a:solidFill>
+                  <a:schemeClr val="accent5">
+                    <a:lumMod val="75000"/>
+                  </a:schemeClr>
+                </a:solidFill>
+              </a:rPr>
+              <a:t>does not need to know how they are applied</a:t>
+            </a:r>
+            <a:r>
+              <a:rPr lang="en-US" sz="2200" dirty="0"/>
+              <a:t>.</a:t>
+            </a:r>
+            <a:endParaRPr lang="en-IN" sz="2200" dirty="0"/>
           </a:p>
         </p:txBody>
       </p:sp>
@@ -4142,6 +5589,2801 @@
   <p:clrMapOvr>
     <a:masterClrMapping/>
   </p:clrMapOvr>
+  <p:transition spd="slow">
+    <p:wipe/>
+  </p:transition>
+</p:sld>
+</file>
+
+<file path=ppt/slides/slide3.xml><?xml version="1.0" encoding="utf-8"?>
+<p:sld xmlns:a="http://schemas.openxmlformats.org/drawingml/2006/main" xmlns:r="http://schemas.openxmlformats.org/officeDocument/2006/relationships" xmlns:p="http://schemas.openxmlformats.org/presentationml/2006/main">
+  <p:cSld>
+    <p:spTree>
+      <p:nvGrpSpPr>
+        <p:cNvPr id="1" name=""/>
+        <p:cNvGrpSpPr/>
+        <p:nvPr/>
+      </p:nvGrpSpPr>
+      <p:grpSpPr>
+        <a:xfrm>
+          <a:off x="0" y="0"/>
+          <a:ext cx="0" cy="0"/>
+          <a:chOff x="0" y="0"/>
+          <a:chExt cx="0" cy="0"/>
+        </a:xfrm>
+      </p:grpSpPr>
+      <p:sp>
+        <p:nvSpPr>
+          <p:cNvPr id="8" name="Rectangle 7">
+            <a:extLst>
+              <a:ext uri="{FF2B5EF4-FFF2-40B4-BE49-F238E27FC236}">
+                <a16:creationId xmlns:a16="http://schemas.microsoft.com/office/drawing/2014/main" id="{9B4E212F-69E1-4220-8723-A9F33AD16C31}"/>
+              </a:ext>
+            </a:extLst>
+          </p:cNvPr>
+          <p:cNvSpPr/>
+          <p:nvPr/>
+        </p:nvSpPr>
+        <p:spPr>
+          <a:xfrm>
+            <a:off x="5107742" y="-1"/>
+            <a:ext cx="7534832" cy="7042246"/>
+          </a:xfrm>
+          <a:prstGeom prst="rect">
+            <a:avLst/>
+          </a:prstGeom>
+          <a:solidFill>
+            <a:srgbClr val="323C4D"/>
+          </a:solidFill>
+          <a:ln>
+            <a:noFill/>
+          </a:ln>
+        </p:spPr>
+        <p:style>
+          <a:lnRef idx="2">
+            <a:schemeClr val="accent1">
+              <a:shade val="50000"/>
+            </a:schemeClr>
+          </a:lnRef>
+          <a:fillRef idx="1">
+            <a:schemeClr val="accent1"/>
+          </a:fillRef>
+          <a:effectRef idx="0">
+            <a:schemeClr val="accent1"/>
+          </a:effectRef>
+          <a:fontRef idx="minor">
+            <a:schemeClr val="lt1"/>
+          </a:fontRef>
+        </p:style>
+        <p:txBody>
+          <a:bodyPr rtlCol="0" anchor="ctr"/>
+          <a:lstStyle/>
+          <a:p>
+            <a:pPr algn="ctr"/>
+            <a:endParaRPr lang="en-IN" dirty="0"/>
+          </a:p>
+        </p:txBody>
+      </p:sp>
+      <p:pic>
+        <p:nvPicPr>
+          <p:cNvPr id="14" name="Picture 13">
+            <a:extLst>
+              <a:ext uri="{FF2B5EF4-FFF2-40B4-BE49-F238E27FC236}">
+                <a16:creationId xmlns:a16="http://schemas.microsoft.com/office/drawing/2014/main" id="{DC6C5D67-8D5E-46C7-B6AA-674EE3B92ACE}"/>
+              </a:ext>
+            </a:extLst>
+          </p:cNvPr>
+          <p:cNvPicPr>
+            <a:picLocks noChangeAspect="1"/>
+          </p:cNvPicPr>
+          <p:nvPr/>
+        </p:nvPicPr>
+        <p:blipFill>
+          <a:blip r:embed="rId2">
+            <a:extLst>
+              <a:ext uri="{BEBA8EAE-BF5A-486C-A8C5-ECC9F3942E4B}">
+                <a14:imgProps xmlns:a14="http://schemas.microsoft.com/office/drawing/2010/main">
+                  <a14:imgLayer r:embed="rId3">
+                    <a14:imgEffect>
+                      <a14:sharpenSoften amount="-50000"/>
+                    </a14:imgEffect>
+                    <a14:imgEffect>
+                      <a14:saturation sat="33000"/>
+                    </a14:imgEffect>
+                    <a14:imgEffect>
+                      <a14:brightnessContrast bright="-20000" contrast="40000"/>
+                    </a14:imgEffect>
+                  </a14:imgLayer>
+                </a14:imgProps>
+              </a:ext>
+              <a:ext uri="{28A0092B-C50C-407E-A947-70E740481C1C}">
+                <a14:useLocalDpi xmlns:a14="http://schemas.microsoft.com/office/drawing/2010/main" val="0"/>
+              </a:ext>
+            </a:extLst>
+          </a:blip>
+          <a:stretch>
+            <a:fillRect/>
+          </a:stretch>
+        </p:blipFill>
+        <p:spPr>
+          <a:xfrm>
+            <a:off x="5107742" y="-160020"/>
+            <a:ext cx="7534832" cy="7040880"/>
+          </a:xfrm>
+          <a:prstGeom prst="rect">
+            <a:avLst/>
+          </a:prstGeom>
+        </p:spPr>
+      </p:pic>
+      <p:pic>
+        <p:nvPicPr>
+          <p:cNvPr id="9" name="Picture 8">
+            <a:extLst>
+              <a:ext uri="{FF2B5EF4-FFF2-40B4-BE49-F238E27FC236}">
+                <a16:creationId xmlns:a16="http://schemas.microsoft.com/office/drawing/2014/main" id="{D9C53DDB-99DF-4447-9CE1-48F9FF7AB9DA}"/>
+              </a:ext>
+            </a:extLst>
+          </p:cNvPr>
+          <p:cNvPicPr>
+            <a:picLocks noChangeAspect="1"/>
+          </p:cNvPicPr>
+          <p:nvPr/>
+        </p:nvPicPr>
+        <p:blipFill>
+          <a:blip r:embed="rId4">
+            <a:extLst>
+              <a:ext uri="{BEBA8EAE-BF5A-486C-A8C5-ECC9F3942E4B}">
+                <a14:imgProps xmlns:a14="http://schemas.microsoft.com/office/drawing/2010/main">
+                  <a14:imgLayer r:embed="rId5">
+                    <a14:imgEffect>
+                      <a14:backgroundRemoval t="4651" b="90233" l="7429" r="94714">
+                        <a14:foregroundMark x1="49714" y1="24884" x2="50857" y2="52791"/>
+                        <a14:foregroundMark x1="50857" y1="52791" x2="54143" y2="36279"/>
+                        <a14:foregroundMark x1="54143" y1="36279" x2="59571" y2="23953"/>
+                        <a14:foregroundMark x1="59571" y1="23953" x2="53714" y2="46279"/>
+                        <a14:foregroundMark x1="53714" y1="46279" x2="56429" y2="35349"/>
+                        <a14:foregroundMark x1="56429" y1="35349" x2="54000" y2="46977"/>
+                        <a14:foregroundMark x1="54000" y1="46977" x2="58286" y2="35814"/>
+                        <a14:foregroundMark x1="58286" y1="35814" x2="57286" y2="32326"/>
+                        <a14:foregroundMark x1="65571" y1="33023" x2="58286" y2="38140"/>
+                        <a14:foregroundMark x1="58286" y1="38140" x2="65000" y2="32326"/>
+                        <a14:foregroundMark x1="65000" y1="32326" x2="67286" y2="44884"/>
+                        <a14:foregroundMark x1="67286" y1="44884" x2="73143" y2="35814"/>
+                        <a14:foregroundMark x1="73143" y1="35814" x2="75143" y2="52558"/>
+                        <a14:foregroundMark x1="75143" y1="52558" x2="78286" y2="40000"/>
+                        <a14:foregroundMark x1="47143" y1="32558" x2="40286" y2="36512"/>
+                        <a14:foregroundMark x1="40286" y1="36512" x2="17286" y2="34884"/>
+                        <a14:foregroundMark x1="21143" y1="25349" x2="15000" y2="66977"/>
+                        <a14:foregroundMark x1="15000" y1="66977" x2="19714" y2="46512"/>
+                        <a14:foregroundMark x1="19714" y1="46512" x2="8000" y2="62558"/>
+                        <a14:foregroundMark x1="8000" y1="62558" x2="9714" y2="33488"/>
+                        <a14:foregroundMark x1="20857" y1="37907" x2="22714" y2="83023"/>
+                        <a14:foregroundMark x1="22714" y1="83023" x2="27143" y2="57907"/>
+                        <a14:foregroundMark x1="27143" y1="57907" x2="28286" y2="72093"/>
+                        <a14:foregroundMark x1="28286" y1="72093" x2="23571" y2="80698"/>
+                        <a14:foregroundMark x1="23571" y1="80698" x2="15000" y2="81628"/>
+                        <a14:foregroundMark x1="15000" y1="81628" x2="7714" y2="78372"/>
+                        <a14:foregroundMark x1="7714" y1="78372" x2="11714" y2="87907"/>
+                        <a14:foregroundMark x1="11714" y1="87907" x2="16714" y2="78140"/>
+                        <a14:foregroundMark x1="16714" y1="78140" x2="15286" y2="71860"/>
+                        <a14:foregroundMark x1="59143" y1="8605" x2="66000" y2="13953"/>
+                        <a14:foregroundMark x1="66000" y1="13953" x2="62714" y2="18372"/>
+                        <a14:foregroundMark x1="90000" y1="41860" x2="92857" y2="52934"/>
+                        <a14:foregroundMark x1="92682" y1="60226" x2="91857" y2="77674"/>
+                        <a14:foregroundMark x1="91857" y1="77674" x2="90443" y2="80033"/>
+                        <a14:foregroundMark x1="76322" y1="90575" x2="72696" y2="91818"/>
+                        <a14:foregroundMark x1="54812" y1="90831" x2="52000" y2="90465"/>
+                        <a14:foregroundMark x1="52000" y1="90465" x2="49286" y2="87907"/>
+                        <a14:foregroundMark x1="91571" y1="42326" x2="94857" y2="41163"/>
+                        <a14:foregroundMark x1="62000" y1="6047" x2="61714" y2="4651"/>
+                        <a14:foregroundMark x1="15429" y1="50000" x2="16286" y2="12326"/>
+                        <a14:backgroundMark x1="38000" y1="10698" x2="38000" y2="10698"/>
+                        <a14:backgroundMark x1="38143" y1="5581" x2="32571" y2="14419"/>
+                        <a14:backgroundMark x1="32571" y1="14419" x2="31000" y2="19535"/>
+                        <a14:backgroundMark x1="51143" y1="3488" x2="36143" y2="15814"/>
+                        <a14:backgroundMark x1="81143" y1="4884" x2="97429" y2="16512"/>
+                        <a14:backgroundMark x1="97429" y1="16512" x2="96286" y2="29302"/>
+                        <a14:backgroundMark x1="96286" y1="29302" x2="98143" y2="42326"/>
+                        <a14:backgroundMark x1="98143" y1="42326" x2="97286" y2="80465"/>
+                        <a14:backgroundMark x1="97286" y1="80465" x2="92429" y2="89302"/>
+                        <a14:backgroundMark x1="92429" y1="89302" x2="85000" y2="95116"/>
+                        <a14:backgroundMark x1="68910" y1="95887" x2="51000" y2="96744"/>
+                        <a14:backgroundMark x1="71202" y1="95777" x2="70972" y2="95788"/>
+                        <a14:backgroundMark x1="85000" y1="95116" x2="71999" y2="95739"/>
+                        <a14:backgroundMark x1="51000" y1="96744" x2="42714" y2="92093"/>
+                        <a14:backgroundMark x1="42714" y1="92093" x2="35857" y2="83721"/>
+                        <a14:backgroundMark x1="35857" y1="83721" x2="34714" y2="51628"/>
+                        <a14:backgroundMark x1="64143" y1="91628" x2="64143" y2="91628"/>
+                        <a14:backgroundMark x1="58714" y1="90930" x2="66857" y2="91163"/>
+                        <a14:backgroundMark x1="65429" y1="91163" x2="74429" y2="96977"/>
+                        <a14:backgroundMark x1="77857" y1="85581" x2="92000" y2="88837"/>
+                        <a14:backgroundMark x1="57857" y1="90000" x2="57857" y2="90000"/>
+                        <a14:backgroundMark x1="59286" y1="90930" x2="53143" y2="96977"/>
+                        <a14:backgroundMark x1="78286" y1="88140" x2="81857" y2="99535"/>
+                        <a14:backgroundMark x1="87286" y1="84186" x2="91857" y2="82558"/>
+                        <a14:backgroundMark x1="93286" y1="53023" x2="92714" y2="60233"/>
+                      </a14:backgroundRemoval>
+                    </a14:imgEffect>
+                    <a14:imgEffect>
+                      <a14:sharpenSoften amount="50000"/>
+                    </a14:imgEffect>
+                    <a14:imgEffect>
+                      <a14:brightnessContrast bright="20000" contrast="-40000"/>
+                    </a14:imgEffect>
+                  </a14:imgLayer>
+                </a14:imgProps>
+              </a:ext>
+              <a:ext uri="{28A0092B-C50C-407E-A947-70E740481C1C}">
+                <a14:useLocalDpi xmlns:a14="http://schemas.microsoft.com/office/drawing/2010/main" val="0"/>
+              </a:ext>
+            </a:extLst>
+          </a:blip>
+          <a:stretch>
+            <a:fillRect/>
+          </a:stretch>
+        </p:blipFill>
+        <p:spPr>
+          <a:xfrm>
+            <a:off x="5107742" y="1345910"/>
+            <a:ext cx="7357411" cy="4519553"/>
+          </a:xfrm>
+          <a:prstGeom prst="rect">
+            <a:avLst/>
+          </a:prstGeom>
+        </p:spPr>
+      </p:pic>
+      <p:sp>
+        <p:nvSpPr>
+          <p:cNvPr id="10" name="TextBox 9">
+            <a:extLst>
+              <a:ext uri="{FF2B5EF4-FFF2-40B4-BE49-F238E27FC236}">
+                <a16:creationId xmlns:a16="http://schemas.microsoft.com/office/drawing/2014/main" id="{0FF60366-0D71-4700-9664-8385EB7F0A39}"/>
+              </a:ext>
+            </a:extLst>
+          </p:cNvPr>
+          <p:cNvSpPr txBox="1"/>
+          <p:nvPr/>
+        </p:nvSpPr>
+        <p:spPr>
+          <a:xfrm>
+            <a:off x="170096" y="1720840"/>
+            <a:ext cx="4722125" cy="3416320"/>
+          </a:xfrm>
+          <a:prstGeom prst="rect">
+            <a:avLst/>
+          </a:prstGeom>
+          <a:noFill/>
+        </p:spPr>
+        <p:txBody>
+          <a:bodyPr wrap="square" rtlCol="0">
+            <a:spAutoFit/>
+          </a:bodyPr>
+          <a:lstStyle/>
+          <a:p>
+            <a:pPr algn="just"/>
+            <a:r>
+              <a:rPr lang="en-US" sz="2400" dirty="0">
+                <a:solidFill>
+                  <a:schemeClr val="tx1">
+                    <a:lumMod val="95000"/>
+                    <a:lumOff val="5000"/>
+                  </a:schemeClr>
+                </a:solidFill>
+              </a:rPr>
+              <a:t>An </a:t>
+            </a:r>
+            <a:r>
+              <a:rPr lang="en-US" sz="2400" b="1" dirty="0">
+                <a:solidFill>
+                  <a:schemeClr val="accent5">
+                    <a:lumMod val="75000"/>
+                  </a:schemeClr>
+                </a:solidFill>
+              </a:rPr>
+              <a:t>abstract data type(ADT)</a:t>
+            </a:r>
+            <a:r>
+              <a:rPr lang="en-US" sz="2400" b="1" dirty="0">
+                <a:solidFill>
+                  <a:schemeClr val="tx1">
+                    <a:lumMod val="95000"/>
+                    <a:lumOff val="5000"/>
+                  </a:schemeClr>
+                </a:solidFill>
+              </a:rPr>
+              <a:t> </a:t>
+            </a:r>
+            <a:r>
+              <a:rPr lang="en-US" sz="2400" dirty="0">
+                <a:solidFill>
+                  <a:schemeClr val="tx1">
+                    <a:lumMod val="95000"/>
+                    <a:lumOff val="5000"/>
+                  </a:schemeClr>
+                </a:solidFill>
+              </a:rPr>
+              <a:t>is an abstraction of a data structure which provides only the interface to which a data structure must adhere to. The interface does not provide any specific details about how things are getting implemented. It will be more clear if we see some examples.</a:t>
+            </a:r>
+            <a:endParaRPr lang="en-IN" sz="2400" dirty="0">
+              <a:solidFill>
+                <a:schemeClr val="tx1">
+                  <a:lumMod val="95000"/>
+                  <a:lumOff val="5000"/>
+                </a:schemeClr>
+              </a:solidFill>
+            </a:endParaRPr>
+          </a:p>
+        </p:txBody>
+      </p:sp>
+      <p:sp>
+        <p:nvSpPr>
+          <p:cNvPr id="13" name="TextBox 12">
+            <a:extLst>
+              <a:ext uri="{FF2B5EF4-FFF2-40B4-BE49-F238E27FC236}">
+                <a16:creationId xmlns:a16="http://schemas.microsoft.com/office/drawing/2014/main" id="{3F895C51-174A-4D5E-95C2-C59A621E321E}"/>
+              </a:ext>
+            </a:extLst>
+          </p:cNvPr>
+          <p:cNvSpPr txBox="1"/>
+          <p:nvPr/>
+        </p:nvSpPr>
+        <p:spPr>
+          <a:xfrm>
+            <a:off x="189146" y="702256"/>
+            <a:ext cx="4478104" cy="923330"/>
+          </a:xfrm>
+          <a:prstGeom prst="rect">
+            <a:avLst/>
+          </a:prstGeom>
+          <a:noFill/>
+        </p:spPr>
+        <p:txBody>
+          <a:bodyPr wrap="square" rtlCol="0">
+            <a:spAutoFit/>
+          </a:bodyPr>
+          <a:lstStyle/>
+          <a:p>
+            <a:r>
+              <a:rPr lang="en-US" sz="5400" b="1" dirty="0">
+                <a:solidFill>
+                  <a:srgbClr val="002060"/>
+                </a:solidFill>
+              </a:rPr>
+              <a:t>WORK</a:t>
+            </a:r>
+            <a:r>
+              <a:rPr lang="en-US" sz="5400" b="1" dirty="0">
+                <a:solidFill>
+                  <a:schemeClr val="accent5">
+                    <a:lumMod val="75000"/>
+                  </a:schemeClr>
+                </a:solidFill>
+              </a:rPr>
+              <a:t>FLOW</a:t>
+            </a:r>
+            <a:endParaRPr lang="en-IN" sz="5400" b="1" dirty="0">
+              <a:solidFill>
+                <a:schemeClr val="accent5">
+                  <a:lumMod val="75000"/>
+                </a:schemeClr>
+              </a:solidFill>
+            </a:endParaRPr>
+          </a:p>
+        </p:txBody>
+      </p:sp>
+    </p:spTree>
+    <p:extLst>
+      <p:ext uri="{BB962C8B-B14F-4D97-AF65-F5344CB8AC3E}">
+        <p14:creationId xmlns:p14="http://schemas.microsoft.com/office/powerpoint/2010/main" val="2224211625"/>
+      </p:ext>
+    </p:extLst>
+  </p:cSld>
+  <p:clrMapOvr>
+    <a:masterClrMapping/>
+  </p:clrMapOvr>
+  <p:transition spd="med">
+    <p:pull/>
+  </p:transition>
+</p:sld>
+</file>
+
+<file path=ppt/slides/slide4.xml><?xml version="1.0" encoding="utf-8"?>
+<p:sld xmlns:a="http://schemas.openxmlformats.org/drawingml/2006/main" xmlns:r="http://schemas.openxmlformats.org/officeDocument/2006/relationships" xmlns:p="http://schemas.openxmlformats.org/presentationml/2006/main">
+  <p:cSld>
+    <p:spTree>
+      <p:nvGrpSpPr>
+        <p:cNvPr id="1" name=""/>
+        <p:cNvGrpSpPr/>
+        <p:nvPr/>
+      </p:nvGrpSpPr>
+      <p:grpSpPr>
+        <a:xfrm>
+          <a:off x="0" y="0"/>
+          <a:ext cx="0" cy="0"/>
+          <a:chOff x="0" y="0"/>
+          <a:chExt cx="0" cy="0"/>
+        </a:xfrm>
+      </p:grpSpPr>
+      <p:pic>
+        <p:nvPicPr>
+          <p:cNvPr id="1026" name="Picture 2" descr="MARKET WRAP: Nifty ends May F&amp;amp;O expiry above 10,700, Sensex gains 416 pts |  Business Standard News">
+            <a:extLst>
+              <a:ext uri="{FF2B5EF4-FFF2-40B4-BE49-F238E27FC236}">
+                <a16:creationId xmlns:a16="http://schemas.microsoft.com/office/drawing/2014/main" id="{A6AC2CAC-F155-4357-BFDF-63BBD61A54F5}"/>
+              </a:ext>
+            </a:extLst>
+          </p:cNvPr>
+          <p:cNvPicPr>
+            <a:picLocks noChangeAspect="1" noChangeArrowheads="1"/>
+          </p:cNvPicPr>
+          <p:nvPr/>
+        </p:nvPicPr>
+        <p:blipFill rotWithShape="1">
+          <a:blip r:embed="rId2">
+            <a:extLst>
+              <a:ext uri="{28A0092B-C50C-407E-A947-70E740481C1C}">
+                <a14:useLocalDpi xmlns:a14="http://schemas.microsoft.com/office/drawing/2010/main" val="0"/>
+              </a:ext>
+            </a:extLst>
+          </a:blip>
+          <a:srcRect l="6129" t="2818" r="8711"/>
+          <a:stretch/>
+        </p:blipFill>
+        <p:spPr bwMode="auto">
+          <a:xfrm>
+            <a:off x="6773031" y="1719084"/>
+            <a:ext cx="5279483" cy="5102460"/>
+          </a:xfrm>
+          <a:prstGeom prst="rect">
+            <a:avLst/>
+          </a:prstGeom>
+          <a:noFill/>
+          <a:extLst>
+            <a:ext uri="{909E8E84-426E-40DD-AFC4-6F175D3DCCD1}">
+              <a14:hiddenFill xmlns:a14="http://schemas.microsoft.com/office/drawing/2010/main">
+                <a:solidFill>
+                  <a:srgbClr val="FFFFFF"/>
+                </a:solidFill>
+              </a14:hiddenFill>
+            </a:ext>
+          </a:extLst>
+        </p:spPr>
+      </p:pic>
+      <p:sp>
+        <p:nvSpPr>
+          <p:cNvPr id="11" name="Rectangle 10">
+            <a:extLst>
+              <a:ext uri="{FF2B5EF4-FFF2-40B4-BE49-F238E27FC236}">
+                <a16:creationId xmlns:a16="http://schemas.microsoft.com/office/drawing/2014/main" id="{CAECEF10-8B5B-432A-A219-34BAA1687BB0}"/>
+              </a:ext>
+            </a:extLst>
+          </p:cNvPr>
+          <p:cNvSpPr/>
+          <p:nvPr/>
+        </p:nvSpPr>
+        <p:spPr>
+          <a:xfrm>
+            <a:off x="-775088" y="6619164"/>
+            <a:ext cx="15449030" cy="562679"/>
+          </a:xfrm>
+          <a:prstGeom prst="rect">
+            <a:avLst/>
+          </a:prstGeom>
+          <a:solidFill>
+            <a:schemeClr val="accent5"/>
+          </a:solidFill>
+          <a:ln>
+            <a:noFill/>
+          </a:ln>
+        </p:spPr>
+        <p:style>
+          <a:lnRef idx="2">
+            <a:schemeClr val="accent1">
+              <a:shade val="50000"/>
+            </a:schemeClr>
+          </a:lnRef>
+          <a:fillRef idx="1">
+            <a:schemeClr val="accent1"/>
+          </a:fillRef>
+          <a:effectRef idx="0">
+            <a:schemeClr val="accent1"/>
+          </a:effectRef>
+          <a:fontRef idx="minor">
+            <a:schemeClr val="lt1"/>
+          </a:fontRef>
+        </p:style>
+        <p:txBody>
+          <a:bodyPr rtlCol="0" anchor="ctr"/>
+          <a:lstStyle/>
+          <a:p>
+            <a:pPr algn="ctr"/>
+            <a:endParaRPr lang="en-IN"/>
+          </a:p>
+        </p:txBody>
+      </p:sp>
+      <p:sp>
+        <p:nvSpPr>
+          <p:cNvPr id="12" name="Rectangle 11">
+            <a:extLst>
+              <a:ext uri="{FF2B5EF4-FFF2-40B4-BE49-F238E27FC236}">
+                <a16:creationId xmlns:a16="http://schemas.microsoft.com/office/drawing/2014/main" id="{16D53D3D-B4C3-4CCB-AB7A-EF34F2E6EB83}"/>
+              </a:ext>
+            </a:extLst>
+          </p:cNvPr>
+          <p:cNvSpPr/>
+          <p:nvPr/>
+        </p:nvSpPr>
+        <p:spPr>
+          <a:xfrm>
+            <a:off x="6264322" y="6619164"/>
+            <a:ext cx="8779741" cy="562683"/>
+          </a:xfrm>
+          <a:prstGeom prst="rect">
+            <a:avLst/>
+          </a:prstGeom>
+          <a:solidFill>
+            <a:srgbClr val="29679F"/>
+          </a:solidFill>
+          <a:ln>
+            <a:noFill/>
+          </a:ln>
+        </p:spPr>
+        <p:style>
+          <a:lnRef idx="2">
+            <a:schemeClr val="accent1">
+              <a:shade val="50000"/>
+            </a:schemeClr>
+          </a:lnRef>
+          <a:fillRef idx="1">
+            <a:schemeClr val="accent1"/>
+          </a:fillRef>
+          <a:effectRef idx="0">
+            <a:schemeClr val="accent1"/>
+          </a:effectRef>
+          <a:fontRef idx="minor">
+            <a:schemeClr val="lt1"/>
+          </a:fontRef>
+        </p:style>
+        <p:txBody>
+          <a:bodyPr rtlCol="0" anchor="ctr"/>
+          <a:lstStyle/>
+          <a:p>
+            <a:pPr algn="ctr"/>
+            <a:endParaRPr lang="en-IN"/>
+          </a:p>
+        </p:txBody>
+      </p:sp>
+      <p:sp>
+        <p:nvSpPr>
+          <p:cNvPr id="4" name="TextBox 3">
+            <a:extLst>
+              <a:ext uri="{FF2B5EF4-FFF2-40B4-BE49-F238E27FC236}">
+                <a16:creationId xmlns:a16="http://schemas.microsoft.com/office/drawing/2014/main" id="{CE0DBE74-6FFB-46BF-9F24-0AE01AE26956}"/>
+              </a:ext>
+            </a:extLst>
+          </p:cNvPr>
+          <p:cNvSpPr txBox="1"/>
+          <p:nvPr/>
+        </p:nvSpPr>
+        <p:spPr>
+          <a:xfrm>
+            <a:off x="320722" y="457200"/>
+            <a:ext cx="5943600" cy="1261884"/>
+          </a:xfrm>
+          <a:prstGeom prst="rect">
+            <a:avLst/>
+          </a:prstGeom>
+          <a:noFill/>
+        </p:spPr>
+        <p:txBody>
+          <a:bodyPr wrap="square" rtlCol="0">
+            <a:spAutoFit/>
+          </a:bodyPr>
+          <a:lstStyle/>
+          <a:p>
+            <a:r>
+              <a:rPr lang="en-IN" sz="4800" b="1" dirty="0">
+                <a:solidFill>
+                  <a:srgbClr val="002060"/>
+                </a:solidFill>
+              </a:rPr>
+              <a:t>REAL LIFE </a:t>
+            </a:r>
+            <a:r>
+              <a:rPr lang="en-IN" sz="4800" b="1" dirty="0">
+                <a:solidFill>
+                  <a:schemeClr val="accent5">
+                    <a:lumMod val="75000"/>
+                  </a:schemeClr>
+                </a:solidFill>
+              </a:rPr>
+              <a:t>EXAMPLE</a:t>
+            </a:r>
+          </a:p>
+          <a:p>
+            <a:r>
+              <a:rPr lang="en-US" sz="2800" b="1" u="sng" dirty="0">
+                <a:solidFill>
+                  <a:schemeClr val="bg2">
+                    <a:lumMod val="25000"/>
+                  </a:schemeClr>
+                </a:solidFill>
+              </a:rPr>
+              <a:t>A</a:t>
+            </a:r>
+            <a:r>
+              <a:rPr lang="en-IN" sz="2800" b="1" u="sng" dirty="0">
+                <a:solidFill>
+                  <a:schemeClr val="bg2">
+                    <a:lumMod val="25000"/>
+                  </a:schemeClr>
+                </a:solidFill>
+              </a:rPr>
+              <a:t>DT MODELING</a:t>
+            </a:r>
+            <a:endParaRPr lang="en-IN" sz="2800" u="sng" dirty="0">
+              <a:solidFill>
+                <a:schemeClr val="bg2">
+                  <a:lumMod val="25000"/>
+                </a:schemeClr>
+              </a:solidFill>
+            </a:endParaRPr>
+          </a:p>
+        </p:txBody>
+      </p:sp>
+      <p:sp>
+        <p:nvSpPr>
+          <p:cNvPr id="15" name="TextBox 14">
+            <a:extLst>
+              <a:ext uri="{FF2B5EF4-FFF2-40B4-BE49-F238E27FC236}">
+                <a16:creationId xmlns:a16="http://schemas.microsoft.com/office/drawing/2014/main" id="{2ED540B6-3A50-4EDB-9127-3463826FC1AA}"/>
+              </a:ext>
+            </a:extLst>
+          </p:cNvPr>
+          <p:cNvSpPr txBox="1"/>
+          <p:nvPr/>
+        </p:nvSpPr>
+        <p:spPr>
+          <a:xfrm>
+            <a:off x="320722" y="1719084"/>
+            <a:ext cx="7985078" cy="4170372"/>
+          </a:xfrm>
+          <a:prstGeom prst="rect">
+            <a:avLst/>
+          </a:prstGeom>
+          <a:noFill/>
+        </p:spPr>
+        <p:txBody>
+          <a:bodyPr wrap="square" rtlCol="0">
+            <a:spAutoFit/>
+          </a:bodyPr>
+          <a:lstStyle/>
+          <a:p>
+            <a:r>
+              <a:rPr lang="en-US" sz="3200" b="1" dirty="0">
+                <a:solidFill>
+                  <a:schemeClr val="accent5">
+                    <a:lumMod val="50000"/>
+                  </a:schemeClr>
+                </a:solidFill>
+              </a:rPr>
+              <a:t>A Simple Stock Trading System (Abstraction of Data Structure)</a:t>
+            </a:r>
+          </a:p>
+          <a:p>
+            <a:endParaRPr lang="en-US" sz="1100" dirty="0"/>
+          </a:p>
+          <a:p>
+            <a:pPr marL="457200" indent="-457200">
+              <a:buFont typeface="Wingdings" panose="05000000000000000000" pitchFamily="2" charset="2"/>
+              <a:buChar char="§"/>
+            </a:pPr>
+            <a:r>
+              <a:rPr lang="en-US" sz="2800" b="1" dirty="0"/>
+              <a:t>Operation:</a:t>
+            </a:r>
+          </a:p>
+          <a:p>
+            <a:pPr marL="800100" lvl="1" indent="-342900">
+              <a:buFont typeface="Arial" panose="020B0604020202020204" pitchFamily="34" charset="0"/>
+              <a:buChar char="•"/>
+            </a:pPr>
+            <a:r>
+              <a:rPr lang="en-US" sz="2400" dirty="0"/>
+              <a:t>Order buy(Stock, Share, Price)</a:t>
+            </a:r>
+          </a:p>
+          <a:p>
+            <a:pPr marL="800100" lvl="1" indent="-342900">
+              <a:buFont typeface="Arial" panose="020B0604020202020204" pitchFamily="34" charset="0"/>
+              <a:buChar char="•"/>
+            </a:pPr>
+            <a:r>
+              <a:rPr lang="en-US" sz="2400" dirty="0"/>
+              <a:t>Order Sell(Stock, Share, Price)</a:t>
+            </a:r>
+            <a:endParaRPr lang="en-IN" sz="2400" dirty="0"/>
+          </a:p>
+          <a:p>
+            <a:pPr marL="800100" lvl="1" indent="-342900">
+              <a:buFont typeface="Arial" panose="020B0604020202020204" pitchFamily="34" charset="0"/>
+              <a:buChar char="•"/>
+            </a:pPr>
+            <a:r>
+              <a:rPr lang="en-US" sz="2400" dirty="0"/>
+              <a:t>Void cancel(order)</a:t>
+            </a:r>
+          </a:p>
+          <a:p>
+            <a:endParaRPr lang="en-US" sz="1100" dirty="0"/>
+          </a:p>
+          <a:p>
+            <a:pPr marL="457200" indent="-457200">
+              <a:buFont typeface="Wingdings" panose="05000000000000000000" pitchFamily="2" charset="2"/>
+              <a:buChar char="§"/>
+            </a:pPr>
+            <a:r>
+              <a:rPr lang="en-US" sz="2800" b="1" dirty="0"/>
+              <a:t>Error Condition(associated with operations)</a:t>
+            </a:r>
+          </a:p>
+          <a:p>
+            <a:pPr marL="800100" lvl="1" indent="-342900">
+              <a:buFont typeface="Arial" panose="020B0604020202020204" pitchFamily="34" charset="0"/>
+              <a:buChar char="•"/>
+            </a:pPr>
+            <a:r>
+              <a:rPr lang="en-US" sz="2400" dirty="0"/>
+              <a:t>Buy/Sell a non existent stock</a:t>
+            </a:r>
+          </a:p>
+          <a:p>
+            <a:pPr marL="800100" lvl="1" indent="-342900">
+              <a:buFont typeface="Arial" panose="020B0604020202020204" pitchFamily="34" charset="0"/>
+              <a:buChar char="•"/>
+            </a:pPr>
+            <a:r>
+              <a:rPr lang="en-US" sz="2400" dirty="0"/>
+              <a:t>Cancel a non existent order</a:t>
+            </a:r>
+            <a:endParaRPr lang="en-IN" sz="2400" dirty="0"/>
+          </a:p>
+        </p:txBody>
+      </p:sp>
+    </p:spTree>
+    <p:extLst>
+      <p:ext uri="{BB962C8B-B14F-4D97-AF65-F5344CB8AC3E}">
+        <p14:creationId xmlns:p14="http://schemas.microsoft.com/office/powerpoint/2010/main" val="185802622"/>
+      </p:ext>
+    </p:extLst>
+  </p:cSld>
+  <p:clrMapOvr>
+    <a:masterClrMapping/>
+  </p:clrMapOvr>
+  <p:transition spd="slow">
+    <p:cover/>
+  </p:transition>
+</p:sld>
+</file>
+
+<file path=ppt/slides/slide5.xml><?xml version="1.0" encoding="utf-8"?>
+<p:sld xmlns:a="http://schemas.openxmlformats.org/drawingml/2006/main" xmlns:r="http://schemas.openxmlformats.org/officeDocument/2006/relationships" xmlns:p="http://schemas.openxmlformats.org/presentationml/2006/main">
+  <p:cSld>
+    <p:spTree>
+      <p:nvGrpSpPr>
+        <p:cNvPr id="1" name=""/>
+        <p:cNvGrpSpPr/>
+        <p:nvPr/>
+      </p:nvGrpSpPr>
+      <p:grpSpPr>
+        <a:xfrm>
+          <a:off x="0" y="0"/>
+          <a:ext cx="0" cy="0"/>
+          <a:chOff x="0" y="0"/>
+          <a:chExt cx="0" cy="0"/>
+        </a:xfrm>
+      </p:grpSpPr>
+      <p:sp>
+        <p:nvSpPr>
+          <p:cNvPr id="5" name="TextBox 4">
+            <a:extLst>
+              <a:ext uri="{FF2B5EF4-FFF2-40B4-BE49-F238E27FC236}">
+                <a16:creationId xmlns:a16="http://schemas.microsoft.com/office/drawing/2014/main" id="{B01CA31B-083E-4ED2-8025-087E8D2A1F08}"/>
+              </a:ext>
+            </a:extLst>
+          </p:cNvPr>
+          <p:cNvSpPr txBox="1"/>
+          <p:nvPr/>
+        </p:nvSpPr>
+        <p:spPr>
+          <a:xfrm>
+            <a:off x="285421" y="411859"/>
+            <a:ext cx="11621157" cy="830997"/>
+          </a:xfrm>
+          <a:prstGeom prst="rect">
+            <a:avLst/>
+          </a:prstGeom>
+          <a:noFill/>
+        </p:spPr>
+        <p:txBody>
+          <a:bodyPr wrap="square" rtlCol="0">
+            <a:spAutoFit/>
+          </a:bodyPr>
+          <a:lstStyle/>
+          <a:p>
+            <a:pPr algn="just"/>
+            <a:r>
+              <a:rPr lang="en-US" sz="4800" b="1" dirty="0">
+                <a:solidFill>
+                  <a:srgbClr val="002060"/>
+                </a:solidFill>
+              </a:rPr>
+              <a:t>Abstract Data Type : </a:t>
+            </a:r>
+            <a:r>
+              <a:rPr lang="en-US" sz="4800" b="1" dirty="0">
+                <a:solidFill>
+                  <a:schemeClr val="accent5">
+                    <a:lumMod val="75000"/>
+                  </a:schemeClr>
+                </a:solidFill>
+              </a:rPr>
+              <a:t>Operations</a:t>
+            </a:r>
+            <a:endParaRPr lang="en-IN" sz="4800" b="1" dirty="0">
+              <a:solidFill>
+                <a:schemeClr val="accent5">
+                  <a:lumMod val="75000"/>
+                </a:schemeClr>
+              </a:solidFill>
+            </a:endParaRPr>
+          </a:p>
+        </p:txBody>
+      </p:sp>
+      <p:sp>
+        <p:nvSpPr>
+          <p:cNvPr id="6" name="TextBox 5">
+            <a:extLst>
+              <a:ext uri="{FF2B5EF4-FFF2-40B4-BE49-F238E27FC236}">
+                <a16:creationId xmlns:a16="http://schemas.microsoft.com/office/drawing/2014/main" id="{4BD6E5D5-5AD3-4E00-B0A2-7CFA681DD771}"/>
+              </a:ext>
+            </a:extLst>
+          </p:cNvPr>
+          <p:cNvSpPr txBox="1"/>
+          <p:nvPr/>
+        </p:nvSpPr>
+        <p:spPr>
+          <a:xfrm>
+            <a:off x="111009" y="1366842"/>
+            <a:ext cx="11737431" cy="5239896"/>
+          </a:xfrm>
+          <a:prstGeom prst="rect">
+            <a:avLst/>
+          </a:prstGeom>
+          <a:noFill/>
+        </p:spPr>
+        <p:txBody>
+          <a:bodyPr wrap="square" rtlCol="0">
+            <a:spAutoFit/>
+          </a:bodyPr>
+          <a:lstStyle/>
+          <a:p>
+            <a:pPr marL="457200" indent="-457200" algn="just" fontAlgn="base">
+              <a:buFont typeface="Wingdings" panose="05000000000000000000" pitchFamily="2" charset="2"/>
+              <a:buChar char="§"/>
+            </a:pPr>
+            <a:r>
+              <a:rPr lang="en-US" sz="2800" b="1" dirty="0">
+                <a:solidFill>
+                  <a:schemeClr val="accent5">
+                    <a:lumMod val="75000"/>
+                  </a:schemeClr>
+                </a:solidFill>
+              </a:rPr>
+              <a:t>Creators:</a:t>
+            </a:r>
+            <a:r>
+              <a:rPr lang="en-US" sz="2800" dirty="0">
+                <a:solidFill>
+                  <a:schemeClr val="accent5">
+                    <a:lumMod val="75000"/>
+                  </a:schemeClr>
+                </a:solidFill>
+              </a:rPr>
+              <a:t> </a:t>
+            </a:r>
+            <a:r>
+              <a:rPr lang="en-US" sz="2800" dirty="0"/>
+              <a:t>Creators create new objects of the type. It may take an object as an argument.</a:t>
+            </a:r>
+          </a:p>
+          <a:p>
+            <a:pPr marL="285750" indent="-285750" algn="just" fontAlgn="base">
+              <a:buFont typeface="Wingdings" panose="05000000000000000000" pitchFamily="2" charset="2"/>
+              <a:buChar char="§"/>
+            </a:pPr>
+            <a:endParaRPr lang="en-US" sz="1400" dirty="0"/>
+          </a:p>
+          <a:p>
+            <a:pPr marL="457200" indent="-457200" algn="just" fontAlgn="base">
+              <a:buFont typeface="Wingdings" panose="05000000000000000000" pitchFamily="2" charset="2"/>
+              <a:buChar char="§"/>
+            </a:pPr>
+            <a:r>
+              <a:rPr lang="en-US" sz="2800" b="1" dirty="0">
+                <a:solidFill>
+                  <a:schemeClr val="accent5">
+                    <a:lumMod val="75000"/>
+                  </a:schemeClr>
+                </a:solidFill>
+              </a:rPr>
+              <a:t>Producers:</a:t>
+            </a:r>
+            <a:r>
+              <a:rPr lang="en-US" sz="2800" dirty="0"/>
+              <a:t> Producers create new objects from old objects of the type. For example, the </a:t>
+            </a:r>
+            <a:r>
+              <a:rPr lang="en-US" sz="2800" dirty="0" err="1"/>
+              <a:t>concat</a:t>
+            </a:r>
+            <a:r>
+              <a:rPr lang="en-US" sz="2800" dirty="0"/>
+              <a:t>() method of the String is a producer that takes two strings and produces a new String representing their concatenation.</a:t>
+            </a:r>
+          </a:p>
+          <a:p>
+            <a:pPr marL="171450" indent="-171450" algn="just" fontAlgn="base">
+              <a:buFont typeface="Wingdings" panose="05000000000000000000" pitchFamily="2" charset="2"/>
+              <a:buChar char="§"/>
+            </a:pPr>
+            <a:endParaRPr lang="en-US" sz="1000" dirty="0"/>
+          </a:p>
+          <a:p>
+            <a:pPr marL="457200" indent="-457200" algn="just" fontAlgn="base">
+              <a:buFont typeface="Wingdings" panose="05000000000000000000" pitchFamily="2" charset="2"/>
+              <a:buChar char="§"/>
+            </a:pPr>
+            <a:r>
+              <a:rPr lang="en-US" sz="2800" b="1" dirty="0">
+                <a:solidFill>
+                  <a:schemeClr val="accent5">
+                    <a:lumMod val="75000"/>
+                  </a:schemeClr>
+                </a:solidFill>
+              </a:rPr>
+              <a:t>Observers:</a:t>
+            </a:r>
+            <a:r>
+              <a:rPr lang="en-US" sz="2800" dirty="0"/>
+              <a:t> Observers take the objects of the abstract type and return objects of a different type. For example, the size() method of the </a:t>
+            </a:r>
+            <a:r>
+              <a:rPr lang="en-US" sz="2800" b="1" dirty="0"/>
+              <a:t>List</a:t>
+            </a:r>
+            <a:r>
+              <a:rPr lang="en-US" sz="2800" dirty="0"/>
+              <a:t> returns an </a:t>
+            </a:r>
+            <a:r>
+              <a:rPr lang="en-US" sz="2800" b="1" dirty="0"/>
+              <a:t>int</a:t>
+            </a:r>
+            <a:r>
+              <a:rPr lang="en-US" sz="2800" dirty="0"/>
+              <a:t>.</a:t>
+            </a:r>
+          </a:p>
+          <a:p>
+            <a:pPr marL="171450" indent="-171450" algn="just" fontAlgn="base">
+              <a:buFont typeface="Wingdings" panose="05000000000000000000" pitchFamily="2" charset="2"/>
+              <a:buChar char="§"/>
+            </a:pPr>
+            <a:endParaRPr lang="en-US" sz="1050" dirty="0"/>
+          </a:p>
+          <a:p>
+            <a:pPr marL="457200" indent="-457200" algn="just" fontAlgn="base">
+              <a:buFont typeface="Wingdings" panose="05000000000000000000" pitchFamily="2" charset="2"/>
+              <a:buChar char="§"/>
+            </a:pPr>
+            <a:r>
+              <a:rPr lang="en-US" sz="2800" b="1" dirty="0">
+                <a:solidFill>
+                  <a:schemeClr val="accent5">
+                    <a:lumMod val="75000"/>
+                  </a:schemeClr>
+                </a:solidFill>
+              </a:rPr>
+              <a:t>Mutators:</a:t>
+            </a:r>
+            <a:r>
+              <a:rPr lang="en-US" sz="2800" dirty="0"/>
+              <a:t> Mutators change objects. For example, the add() method of List changes a list by adding an element to the end.</a:t>
+            </a:r>
+          </a:p>
+          <a:p>
+            <a:pPr algn="just"/>
+            <a:endParaRPr lang="en-IN" sz="2000" dirty="0"/>
+          </a:p>
+        </p:txBody>
+      </p:sp>
+      <p:sp>
+        <p:nvSpPr>
+          <p:cNvPr id="37" name="Rectangle 36">
+            <a:extLst>
+              <a:ext uri="{FF2B5EF4-FFF2-40B4-BE49-F238E27FC236}">
+                <a16:creationId xmlns:a16="http://schemas.microsoft.com/office/drawing/2014/main" id="{9343D31A-58A5-4E2E-9AE2-567625C0653F}"/>
+              </a:ext>
+            </a:extLst>
+          </p:cNvPr>
+          <p:cNvSpPr/>
+          <p:nvPr/>
+        </p:nvSpPr>
+        <p:spPr>
+          <a:xfrm>
+            <a:off x="-775088" y="6619164"/>
+            <a:ext cx="15449030" cy="562679"/>
+          </a:xfrm>
+          <a:prstGeom prst="rect">
+            <a:avLst/>
+          </a:prstGeom>
+          <a:solidFill>
+            <a:schemeClr val="accent5"/>
+          </a:solidFill>
+          <a:ln>
+            <a:noFill/>
+          </a:ln>
+        </p:spPr>
+        <p:style>
+          <a:lnRef idx="2">
+            <a:schemeClr val="accent1">
+              <a:shade val="50000"/>
+            </a:schemeClr>
+          </a:lnRef>
+          <a:fillRef idx="1">
+            <a:schemeClr val="accent1"/>
+          </a:fillRef>
+          <a:effectRef idx="0">
+            <a:schemeClr val="accent1"/>
+          </a:effectRef>
+          <a:fontRef idx="minor">
+            <a:schemeClr val="lt1"/>
+          </a:fontRef>
+        </p:style>
+        <p:txBody>
+          <a:bodyPr rtlCol="0" anchor="ctr"/>
+          <a:lstStyle/>
+          <a:p>
+            <a:pPr algn="ctr"/>
+            <a:endParaRPr lang="en-IN"/>
+          </a:p>
+        </p:txBody>
+      </p:sp>
+      <p:sp>
+        <p:nvSpPr>
+          <p:cNvPr id="38" name="Rectangle 37">
+            <a:extLst>
+              <a:ext uri="{FF2B5EF4-FFF2-40B4-BE49-F238E27FC236}">
+                <a16:creationId xmlns:a16="http://schemas.microsoft.com/office/drawing/2014/main" id="{888AADBF-CA26-47AE-9D73-34CDDC81933D}"/>
+              </a:ext>
+            </a:extLst>
+          </p:cNvPr>
+          <p:cNvSpPr/>
+          <p:nvPr/>
+        </p:nvSpPr>
+        <p:spPr>
+          <a:xfrm>
+            <a:off x="6264322" y="6619164"/>
+            <a:ext cx="8779741" cy="562683"/>
+          </a:xfrm>
+          <a:prstGeom prst="rect">
+            <a:avLst/>
+          </a:prstGeom>
+          <a:solidFill>
+            <a:srgbClr val="29679F"/>
+          </a:solidFill>
+          <a:ln>
+            <a:noFill/>
+          </a:ln>
+        </p:spPr>
+        <p:style>
+          <a:lnRef idx="2">
+            <a:schemeClr val="accent1">
+              <a:shade val="50000"/>
+            </a:schemeClr>
+          </a:lnRef>
+          <a:fillRef idx="1">
+            <a:schemeClr val="accent1"/>
+          </a:fillRef>
+          <a:effectRef idx="0">
+            <a:schemeClr val="accent1"/>
+          </a:effectRef>
+          <a:fontRef idx="minor">
+            <a:schemeClr val="lt1"/>
+          </a:fontRef>
+        </p:style>
+        <p:txBody>
+          <a:bodyPr rtlCol="0" anchor="ctr"/>
+          <a:lstStyle/>
+          <a:p>
+            <a:pPr algn="ctr"/>
+            <a:endParaRPr lang="en-IN"/>
+          </a:p>
+        </p:txBody>
+      </p:sp>
+    </p:spTree>
+    <p:extLst>
+      <p:ext uri="{BB962C8B-B14F-4D97-AF65-F5344CB8AC3E}">
+        <p14:creationId xmlns:p14="http://schemas.microsoft.com/office/powerpoint/2010/main" val="3912322512"/>
+      </p:ext>
+    </p:extLst>
+  </p:cSld>
+  <p:clrMapOvr>
+    <a:masterClrMapping/>
+  </p:clrMapOvr>
+  <p:transition spd="slow">
+    <p:push dir="u"/>
+  </p:transition>
+</p:sld>
+</file>
+
+<file path=ppt/slides/slide6.xml><?xml version="1.0" encoding="utf-8"?>
+<p:sld xmlns:a="http://schemas.openxmlformats.org/drawingml/2006/main" xmlns:r="http://schemas.openxmlformats.org/officeDocument/2006/relationships" xmlns:p="http://schemas.openxmlformats.org/presentationml/2006/main">
+  <p:cSld>
+    <p:spTree>
+      <p:nvGrpSpPr>
+        <p:cNvPr id="1" name=""/>
+        <p:cNvGrpSpPr/>
+        <p:nvPr/>
+      </p:nvGrpSpPr>
+      <p:grpSpPr>
+        <a:xfrm>
+          <a:off x="0" y="0"/>
+          <a:ext cx="0" cy="0"/>
+          <a:chOff x="0" y="0"/>
+          <a:chExt cx="0" cy="0"/>
+        </a:xfrm>
+      </p:grpSpPr>
+      <p:sp>
+        <p:nvSpPr>
+          <p:cNvPr id="8" name="Rectangle 7">
+            <a:extLst>
+              <a:ext uri="{FF2B5EF4-FFF2-40B4-BE49-F238E27FC236}">
+                <a16:creationId xmlns:a16="http://schemas.microsoft.com/office/drawing/2014/main" id="{B74B1EFB-2938-4F78-8687-FA3D891AD54A}"/>
+              </a:ext>
+            </a:extLst>
+          </p:cNvPr>
+          <p:cNvSpPr/>
+          <p:nvPr/>
+        </p:nvSpPr>
+        <p:spPr>
+          <a:xfrm>
+            <a:off x="0" y="-1"/>
+            <a:ext cx="12192000" cy="7042246"/>
+          </a:xfrm>
+          <a:prstGeom prst="rect">
+            <a:avLst/>
+          </a:prstGeom>
+          <a:solidFill>
+            <a:srgbClr val="323C4D"/>
+          </a:solidFill>
+          <a:ln>
+            <a:noFill/>
+          </a:ln>
+        </p:spPr>
+        <p:style>
+          <a:lnRef idx="2">
+            <a:schemeClr val="accent1">
+              <a:shade val="50000"/>
+            </a:schemeClr>
+          </a:lnRef>
+          <a:fillRef idx="1">
+            <a:schemeClr val="accent1"/>
+          </a:fillRef>
+          <a:effectRef idx="0">
+            <a:schemeClr val="accent1"/>
+          </a:effectRef>
+          <a:fontRef idx="minor">
+            <a:schemeClr val="lt1"/>
+          </a:fontRef>
+        </p:style>
+        <p:txBody>
+          <a:bodyPr rtlCol="0" anchor="ctr"/>
+          <a:lstStyle/>
+          <a:p>
+            <a:pPr algn="ctr"/>
+            <a:endParaRPr lang="en-IN" dirty="0"/>
+          </a:p>
+        </p:txBody>
+      </p:sp>
+      <p:pic>
+        <p:nvPicPr>
+          <p:cNvPr id="12" name="Picture 11">
+            <a:extLst>
+              <a:ext uri="{FF2B5EF4-FFF2-40B4-BE49-F238E27FC236}">
+                <a16:creationId xmlns:a16="http://schemas.microsoft.com/office/drawing/2014/main" id="{E69702E3-3240-4CCD-BE59-72EE829C0C96}"/>
+              </a:ext>
+            </a:extLst>
+          </p:cNvPr>
+          <p:cNvPicPr>
+            <a:picLocks noChangeAspect="1"/>
+          </p:cNvPicPr>
+          <p:nvPr/>
+        </p:nvPicPr>
+        <p:blipFill>
+          <a:blip r:embed="rId2">
+            <a:extLst>
+              <a:ext uri="{BEBA8EAE-BF5A-486C-A8C5-ECC9F3942E4B}">
+                <a14:imgProps xmlns:a14="http://schemas.microsoft.com/office/drawing/2010/main">
+                  <a14:imgLayer r:embed="rId3">
+                    <a14:imgEffect>
+                      <a14:sharpenSoften amount="-50000"/>
+                    </a14:imgEffect>
+                    <a14:imgEffect>
+                      <a14:saturation sat="33000"/>
+                    </a14:imgEffect>
+                    <a14:imgEffect>
+                      <a14:brightnessContrast bright="-20000" contrast="40000"/>
+                    </a14:imgEffect>
+                  </a14:imgLayer>
+                </a14:imgProps>
+              </a:ext>
+              <a:ext uri="{28A0092B-C50C-407E-A947-70E740481C1C}">
+                <a14:useLocalDpi xmlns:a14="http://schemas.microsoft.com/office/drawing/2010/main" val="0"/>
+              </a:ext>
+            </a:extLst>
+          </a:blip>
+          <a:stretch>
+            <a:fillRect/>
+          </a:stretch>
+        </p:blipFill>
+        <p:spPr>
+          <a:xfrm>
+            <a:off x="-7327" y="1365"/>
+            <a:ext cx="12199327" cy="7040880"/>
+          </a:xfrm>
+          <a:prstGeom prst="rect">
+            <a:avLst/>
+          </a:prstGeom>
+        </p:spPr>
+      </p:pic>
+      <p:pic>
+        <p:nvPicPr>
+          <p:cNvPr id="3" name="Picture 2">
+            <a:extLst>
+              <a:ext uri="{FF2B5EF4-FFF2-40B4-BE49-F238E27FC236}">
+                <a16:creationId xmlns:a16="http://schemas.microsoft.com/office/drawing/2014/main" id="{63AA5606-2E39-44AC-8643-8E6C1E76658F}"/>
+              </a:ext>
+            </a:extLst>
+          </p:cNvPr>
+          <p:cNvPicPr>
+            <a:picLocks noChangeAspect="1"/>
+          </p:cNvPicPr>
+          <p:nvPr/>
+        </p:nvPicPr>
+        <p:blipFill>
+          <a:blip r:embed="rId4">
+            <a:extLst>
+              <a:ext uri="{28A0092B-C50C-407E-A947-70E740481C1C}">
+                <a14:useLocalDpi xmlns:a14="http://schemas.microsoft.com/office/drawing/2010/main" val="0"/>
+              </a:ext>
+            </a:extLst>
+          </a:blip>
+          <a:stretch>
+            <a:fillRect/>
+          </a:stretch>
+        </p:blipFill>
+        <p:spPr>
+          <a:xfrm>
+            <a:off x="4960361" y="1463040"/>
+            <a:ext cx="6758629" cy="4553460"/>
+          </a:xfrm>
+          <a:prstGeom prst="round2DiagRect">
+            <a:avLst>
+              <a:gd name="adj1" fmla="val 16667"/>
+              <a:gd name="adj2" fmla="val 0"/>
+            </a:avLst>
+          </a:prstGeom>
+          <a:ln w="88900" cap="sq">
+            <a:solidFill>
+              <a:srgbClr val="FFFFFF"/>
+            </a:solidFill>
+            <a:miter lim="800000"/>
+          </a:ln>
+          <a:effectLst>
+            <a:glow rad="139700">
+              <a:schemeClr val="accent5">
+                <a:satMod val="175000"/>
+                <a:alpha val="40000"/>
+              </a:schemeClr>
+            </a:glow>
+            <a:outerShdw blurRad="254000" algn="tl" rotWithShape="0">
+              <a:srgbClr val="000000">
+                <a:alpha val="43000"/>
+              </a:srgbClr>
+            </a:outerShdw>
+          </a:effectLst>
+        </p:spPr>
+      </p:pic>
+      <p:sp>
+        <p:nvSpPr>
+          <p:cNvPr id="4" name="TextBox 3">
+            <a:extLst>
+              <a:ext uri="{FF2B5EF4-FFF2-40B4-BE49-F238E27FC236}">
+                <a16:creationId xmlns:a16="http://schemas.microsoft.com/office/drawing/2014/main" id="{9C4B6FC9-C705-4328-BF06-AF47EEA7716B}"/>
+              </a:ext>
+            </a:extLst>
+          </p:cNvPr>
+          <p:cNvSpPr txBox="1"/>
+          <p:nvPr/>
+        </p:nvSpPr>
+        <p:spPr>
+          <a:xfrm>
+            <a:off x="332235" y="917403"/>
+            <a:ext cx="4308345" cy="5724644"/>
+          </a:xfrm>
+          <a:prstGeom prst="rect">
+            <a:avLst/>
+          </a:prstGeom>
+          <a:noFill/>
+        </p:spPr>
+        <p:txBody>
+          <a:bodyPr wrap="square" rtlCol="0">
+            <a:spAutoFit/>
+          </a:bodyPr>
+          <a:lstStyle/>
+          <a:p>
+            <a:pPr algn="just" fontAlgn="base"/>
+            <a:r>
+              <a:rPr lang="en-US" sz="2800" dirty="0">
+                <a:solidFill>
+                  <a:schemeClr val="bg1"/>
+                </a:solidFill>
+              </a:rPr>
+              <a:t>The </a:t>
+            </a:r>
+            <a:r>
+              <a:rPr lang="en-US" sz="2800" b="1" dirty="0">
+                <a:solidFill>
+                  <a:schemeClr val="bg1"/>
+                </a:solidFill>
+              </a:rPr>
+              <a:t>list</a:t>
+            </a:r>
+            <a:r>
+              <a:rPr lang="en-US" sz="2800" dirty="0">
+                <a:solidFill>
+                  <a:schemeClr val="bg1"/>
+                </a:solidFill>
+              </a:rPr>
+              <a:t> is an interface of Java List. The list is </a:t>
+            </a:r>
+            <a:r>
+              <a:rPr lang="en-US" sz="2800" b="1" dirty="0">
+                <a:solidFill>
+                  <a:schemeClr val="bg1"/>
+                </a:solidFill>
+              </a:rPr>
+              <a:t>mutable</a:t>
+            </a:r>
+            <a:r>
+              <a:rPr lang="en-US" sz="2800" dirty="0">
+                <a:solidFill>
+                  <a:schemeClr val="bg1"/>
+                </a:solidFill>
+              </a:rPr>
+              <a:t>. Its operations are:</a:t>
+            </a:r>
+          </a:p>
+          <a:p>
+            <a:pPr algn="just" fontAlgn="base"/>
+            <a:endParaRPr lang="en-US" sz="1000" dirty="0">
+              <a:solidFill>
+                <a:schemeClr val="bg1"/>
+              </a:solidFill>
+            </a:endParaRPr>
+          </a:p>
+          <a:p>
+            <a:pPr algn="just" fontAlgn="base"/>
+            <a:r>
+              <a:rPr lang="en-US" sz="2800" b="1" dirty="0">
+                <a:solidFill>
+                  <a:schemeClr val="accent4"/>
+                </a:solidFill>
+              </a:rPr>
+              <a:t>creators:</a:t>
+            </a:r>
+            <a:r>
+              <a:rPr lang="en-US" sz="2800" dirty="0">
+                <a:solidFill>
+                  <a:schemeClr val="bg1"/>
+                </a:solidFill>
+              </a:rPr>
+              <a:t> </a:t>
+            </a:r>
+            <a:r>
+              <a:rPr lang="en-US" sz="2800" dirty="0" err="1">
+                <a:solidFill>
+                  <a:schemeClr val="bg1"/>
+                </a:solidFill>
+              </a:rPr>
+              <a:t>ArrayList</a:t>
+            </a:r>
+            <a:r>
+              <a:rPr lang="en-US" sz="2800" dirty="0">
+                <a:solidFill>
+                  <a:schemeClr val="bg1"/>
+                </a:solidFill>
+              </a:rPr>
+              <a:t> and LinkedList constructors, Collections. </a:t>
+            </a:r>
+            <a:r>
+              <a:rPr lang="en-US" sz="2800" dirty="0" err="1">
+                <a:solidFill>
+                  <a:schemeClr val="bg1"/>
+                </a:solidFill>
+              </a:rPr>
+              <a:t>singletonList</a:t>
+            </a:r>
+            <a:endParaRPr lang="en-US" sz="2800" dirty="0">
+              <a:solidFill>
+                <a:schemeClr val="bg1"/>
+              </a:solidFill>
+            </a:endParaRPr>
+          </a:p>
+          <a:p>
+            <a:pPr algn="just" fontAlgn="base"/>
+            <a:endParaRPr lang="en-US" sz="800" dirty="0">
+              <a:solidFill>
+                <a:schemeClr val="bg1"/>
+              </a:solidFill>
+            </a:endParaRPr>
+          </a:p>
+          <a:p>
+            <a:pPr algn="just" fontAlgn="base"/>
+            <a:r>
+              <a:rPr lang="en-US" sz="2800" b="1" dirty="0">
+                <a:solidFill>
+                  <a:schemeClr val="accent4"/>
+                </a:solidFill>
+              </a:rPr>
+              <a:t>producers:</a:t>
+            </a:r>
+            <a:r>
+              <a:rPr lang="en-US" sz="2800" dirty="0">
+                <a:solidFill>
+                  <a:schemeClr val="bg1"/>
+                </a:solidFill>
+              </a:rPr>
+              <a:t> </a:t>
+            </a:r>
+            <a:r>
+              <a:rPr lang="en-US" sz="2800" dirty="0" err="1">
+                <a:solidFill>
+                  <a:schemeClr val="bg1"/>
+                </a:solidFill>
+              </a:rPr>
+              <a:t>Collections.unmodifiableList</a:t>
+            </a:r>
+            <a:endParaRPr lang="en-US" sz="2800" dirty="0">
+              <a:solidFill>
+                <a:schemeClr val="bg1"/>
+              </a:solidFill>
+            </a:endParaRPr>
+          </a:p>
+          <a:p>
+            <a:pPr algn="just" fontAlgn="base"/>
+            <a:endParaRPr lang="en-US" sz="1000" dirty="0">
+              <a:solidFill>
+                <a:schemeClr val="bg1"/>
+              </a:solidFill>
+            </a:endParaRPr>
+          </a:p>
+          <a:p>
+            <a:pPr algn="just" fontAlgn="base"/>
+            <a:r>
+              <a:rPr lang="en-US" sz="2800" b="1" dirty="0">
+                <a:solidFill>
+                  <a:schemeClr val="bg1"/>
+                </a:solidFill>
+              </a:rPr>
+              <a:t>observers:</a:t>
+            </a:r>
+            <a:r>
+              <a:rPr lang="en-US" sz="2800" dirty="0">
+                <a:solidFill>
+                  <a:schemeClr val="bg1"/>
+                </a:solidFill>
+              </a:rPr>
+              <a:t> size, get</a:t>
+            </a:r>
+          </a:p>
+          <a:p>
+            <a:pPr algn="just" fontAlgn="base"/>
+            <a:endParaRPr lang="en-US" sz="700" dirty="0">
+              <a:solidFill>
+                <a:schemeClr val="bg1"/>
+              </a:solidFill>
+            </a:endParaRPr>
+          </a:p>
+          <a:p>
+            <a:pPr algn="just" fontAlgn="base"/>
+            <a:r>
+              <a:rPr lang="en-US" sz="2800" b="1" dirty="0">
+                <a:solidFill>
+                  <a:schemeClr val="accent4"/>
+                </a:solidFill>
+              </a:rPr>
+              <a:t>mutators:</a:t>
+            </a:r>
+            <a:r>
+              <a:rPr lang="en-US" sz="2800" dirty="0">
+                <a:solidFill>
+                  <a:schemeClr val="bg1"/>
+                </a:solidFill>
+              </a:rPr>
+              <a:t> add, remove, </a:t>
+            </a:r>
+            <a:r>
+              <a:rPr lang="en-US" sz="2800" dirty="0" err="1">
+                <a:solidFill>
+                  <a:schemeClr val="bg1"/>
+                </a:solidFill>
+              </a:rPr>
+              <a:t>addAll</a:t>
+            </a:r>
+            <a:r>
+              <a:rPr lang="en-US" sz="2800" dirty="0">
+                <a:solidFill>
+                  <a:schemeClr val="bg1"/>
+                </a:solidFill>
+              </a:rPr>
+              <a:t>, </a:t>
+            </a:r>
+            <a:r>
+              <a:rPr lang="en-US" sz="2800" dirty="0" err="1">
+                <a:solidFill>
+                  <a:schemeClr val="bg1"/>
+                </a:solidFill>
+              </a:rPr>
+              <a:t>Collections.sort</a:t>
+            </a:r>
+            <a:endParaRPr lang="en-US" sz="2800" dirty="0">
+              <a:solidFill>
+                <a:schemeClr val="bg1"/>
+              </a:solidFill>
+            </a:endParaRPr>
+          </a:p>
+          <a:p>
+            <a:endParaRPr lang="en-IN" sz="1600" dirty="0"/>
+          </a:p>
+        </p:txBody>
+      </p:sp>
+    </p:spTree>
+    <p:extLst>
+      <p:ext uri="{BB962C8B-B14F-4D97-AF65-F5344CB8AC3E}">
+        <p14:creationId xmlns:p14="http://schemas.microsoft.com/office/powerpoint/2010/main" val="3440147508"/>
+      </p:ext>
+    </p:extLst>
+  </p:cSld>
+  <p:clrMapOvr>
+    <a:masterClrMapping/>
+  </p:clrMapOvr>
+  <p:transition spd="slow">
+    <p:wipe/>
+  </p:transition>
+</p:sld>
+</file>
+
+<file path=ppt/slides/slide7.xml><?xml version="1.0" encoding="utf-8"?>
+<p:sld xmlns:a="http://schemas.openxmlformats.org/drawingml/2006/main" xmlns:r="http://schemas.openxmlformats.org/officeDocument/2006/relationships" xmlns:p="http://schemas.openxmlformats.org/presentationml/2006/main">
+  <p:cSld>
+    <p:spTree>
+      <p:nvGrpSpPr>
+        <p:cNvPr id="1" name=""/>
+        <p:cNvGrpSpPr/>
+        <p:nvPr/>
+      </p:nvGrpSpPr>
+      <p:grpSpPr>
+        <a:xfrm>
+          <a:off x="0" y="0"/>
+          <a:ext cx="0" cy="0"/>
+          <a:chOff x="0" y="0"/>
+          <a:chExt cx="0" cy="0"/>
+        </a:xfrm>
+      </p:grpSpPr>
+      <p:pic>
+        <p:nvPicPr>
+          <p:cNvPr id="5" name="Picture 4">
+            <a:extLst>
+              <a:ext uri="{FF2B5EF4-FFF2-40B4-BE49-F238E27FC236}">
+                <a16:creationId xmlns:a16="http://schemas.microsoft.com/office/drawing/2014/main" id="{663C4415-3E0F-4462-8586-CF158B78E749}"/>
+              </a:ext>
+            </a:extLst>
+          </p:cNvPr>
+          <p:cNvPicPr>
+            <a:picLocks noChangeAspect="1"/>
+          </p:cNvPicPr>
+          <p:nvPr/>
+        </p:nvPicPr>
+        <p:blipFill rotWithShape="1">
+          <a:blip r:embed="rId2">
+            <a:extLst>
+              <a:ext uri="{28A0092B-C50C-407E-A947-70E740481C1C}">
+                <a14:useLocalDpi xmlns:a14="http://schemas.microsoft.com/office/drawing/2010/main" val="0"/>
+              </a:ext>
+            </a:extLst>
+          </a:blip>
+          <a:srcRect l="25728" t="15772" r="23268" b="12176"/>
+          <a:stretch/>
+        </p:blipFill>
+        <p:spPr>
+          <a:xfrm>
+            <a:off x="7214807" y="1595069"/>
+            <a:ext cx="3963733" cy="4256978"/>
+          </a:xfrm>
+          <a:prstGeom prst="rect">
+            <a:avLst/>
+          </a:prstGeom>
+          <a:solidFill>
+            <a:srgbClr val="FFFFFF">
+              <a:shade val="85000"/>
+            </a:srgbClr>
+          </a:solidFill>
+          <a:ln w="190500" cap="sq">
+            <a:solidFill>
+              <a:srgbClr val="FFFFFF"/>
+            </a:solidFill>
+            <a:miter lim="800000"/>
+          </a:ln>
+          <a:effectLst>
+            <a:outerShdw blurRad="65000" dist="50800" dir="12900000" kx="195000" ky="145000" algn="tl" rotWithShape="0">
+              <a:srgbClr val="000000">
+                <a:alpha val="30000"/>
+              </a:srgbClr>
+            </a:outerShdw>
+          </a:effectLst>
+          <a:scene3d>
+            <a:camera prst="orthographicFront">
+              <a:rot lat="0" lon="0" rev="360000"/>
+            </a:camera>
+            <a:lightRig rig="twoPt" dir="t">
+              <a:rot lat="0" lon="0" rev="7200000"/>
+            </a:lightRig>
+          </a:scene3d>
+          <a:sp3d contourW="12700">
+            <a:bevelT w="25400" h="19050"/>
+            <a:contourClr>
+              <a:srgbClr val="969696"/>
+            </a:contourClr>
+          </a:sp3d>
+        </p:spPr>
+      </p:pic>
+      <p:sp>
+        <p:nvSpPr>
+          <p:cNvPr id="7" name="TextBox 6">
+            <a:extLst>
+              <a:ext uri="{FF2B5EF4-FFF2-40B4-BE49-F238E27FC236}">
+                <a16:creationId xmlns:a16="http://schemas.microsoft.com/office/drawing/2014/main" id="{33B558FE-2D57-4B03-8FD7-D159F0FEB500}"/>
+              </a:ext>
+            </a:extLst>
+          </p:cNvPr>
+          <p:cNvSpPr txBox="1"/>
+          <p:nvPr/>
+        </p:nvSpPr>
+        <p:spPr>
+          <a:xfrm>
+            <a:off x="320040" y="357723"/>
+            <a:ext cx="5737860" cy="830997"/>
+          </a:xfrm>
+          <a:prstGeom prst="rect">
+            <a:avLst/>
+          </a:prstGeom>
+          <a:noFill/>
+        </p:spPr>
+        <p:txBody>
+          <a:bodyPr wrap="square" rtlCol="0">
+            <a:spAutoFit/>
+          </a:bodyPr>
+          <a:lstStyle/>
+          <a:p>
+            <a:r>
+              <a:rPr lang="en-US" sz="4800" b="1" dirty="0">
+                <a:solidFill>
+                  <a:srgbClr val="002060"/>
+                </a:solidFill>
+              </a:rPr>
+              <a:t>THE </a:t>
+            </a:r>
+            <a:r>
+              <a:rPr lang="en-US" sz="4800" b="1" dirty="0">
+                <a:solidFill>
+                  <a:schemeClr val="accent5">
+                    <a:lumMod val="75000"/>
+                  </a:schemeClr>
+                </a:solidFill>
+              </a:rPr>
+              <a:t>STACK</a:t>
+            </a:r>
+            <a:r>
+              <a:rPr lang="en-US" sz="4800" b="1" dirty="0">
+                <a:solidFill>
+                  <a:srgbClr val="002060"/>
+                </a:solidFill>
+              </a:rPr>
+              <a:t> ADT</a:t>
+            </a:r>
+            <a:endParaRPr lang="en-IN" sz="4800" b="1" dirty="0">
+              <a:solidFill>
+                <a:srgbClr val="002060"/>
+              </a:solidFill>
+            </a:endParaRPr>
+          </a:p>
+        </p:txBody>
+      </p:sp>
+      <p:sp>
+        <p:nvSpPr>
+          <p:cNvPr id="9" name="TextBox 8">
+            <a:extLst>
+              <a:ext uri="{FF2B5EF4-FFF2-40B4-BE49-F238E27FC236}">
+                <a16:creationId xmlns:a16="http://schemas.microsoft.com/office/drawing/2014/main" id="{35152BE5-66DE-4858-9F0D-68EEFD603578}"/>
+              </a:ext>
+            </a:extLst>
+          </p:cNvPr>
+          <p:cNvSpPr txBox="1"/>
+          <p:nvPr/>
+        </p:nvSpPr>
+        <p:spPr>
+          <a:xfrm>
+            <a:off x="320040" y="1352758"/>
+            <a:ext cx="6149340" cy="4770537"/>
+          </a:xfrm>
+          <a:prstGeom prst="rect">
+            <a:avLst/>
+          </a:prstGeom>
+          <a:noFill/>
+        </p:spPr>
+        <p:txBody>
+          <a:bodyPr wrap="square" rtlCol="0">
+            <a:spAutoFit/>
+          </a:bodyPr>
+          <a:lstStyle/>
+          <a:p>
+            <a:pPr algn="just"/>
+            <a:r>
+              <a:rPr lang="en-US" sz="2400" b="1" dirty="0"/>
+              <a:t>Objects:</a:t>
+            </a:r>
+          </a:p>
+          <a:p>
+            <a:pPr marL="342900" indent="-342900" algn="just">
+              <a:buFont typeface="Wingdings" panose="05000000000000000000" pitchFamily="2" charset="2"/>
+              <a:buChar char="§"/>
+            </a:pPr>
+            <a:r>
+              <a:rPr lang="en-US" sz="2400" dirty="0"/>
+              <a:t>A finite sequence of elements of the same type</a:t>
+            </a:r>
+          </a:p>
+          <a:p>
+            <a:pPr marL="342900" indent="-342900" algn="just">
+              <a:buFont typeface="Wingdings" panose="05000000000000000000" pitchFamily="2" charset="2"/>
+              <a:buChar char="§"/>
+            </a:pPr>
+            <a:r>
+              <a:rPr lang="en-US" sz="2400" dirty="0"/>
+              <a:t>Additions restricted to one end of the sequence called the top of the Stack</a:t>
+            </a:r>
+          </a:p>
+          <a:p>
+            <a:pPr marL="342900" indent="-342900" algn="just">
+              <a:buFont typeface="Wingdings" panose="05000000000000000000" pitchFamily="2" charset="2"/>
+              <a:buChar char="§"/>
+            </a:pPr>
+            <a:r>
+              <a:rPr lang="en-US" sz="2400" dirty="0"/>
+              <a:t>Deletions also restricted to the same end</a:t>
+            </a:r>
+          </a:p>
+          <a:p>
+            <a:pPr marL="285750" indent="-285750" algn="just">
+              <a:buFont typeface="Wingdings" panose="05000000000000000000" pitchFamily="2" charset="2"/>
+              <a:buChar char="§"/>
+            </a:pPr>
+            <a:endParaRPr lang="en-US" sz="1600" dirty="0"/>
+          </a:p>
+          <a:p>
+            <a:pPr marL="342900" indent="-342900" algn="just">
+              <a:buFont typeface="Wingdings" panose="05000000000000000000" pitchFamily="2" charset="2"/>
+              <a:buChar char="§"/>
+            </a:pPr>
+            <a:r>
+              <a:rPr lang="en-US" sz="2400" b="1" dirty="0"/>
+              <a:t>Operations:</a:t>
+            </a:r>
+          </a:p>
+          <a:p>
+            <a:pPr marL="800100" lvl="1" indent="-342900" algn="just">
+              <a:buFont typeface="Arial" panose="020B0604020202020204" pitchFamily="34" charset="0"/>
+              <a:buChar char="•"/>
+            </a:pPr>
+            <a:r>
+              <a:rPr lang="en-US" sz="2400" dirty="0" err="1"/>
+              <a:t>Initialise</a:t>
+            </a:r>
+            <a:endParaRPr lang="en-US" sz="2400" dirty="0"/>
+          </a:p>
+          <a:p>
+            <a:pPr marL="800100" lvl="1" indent="-342900" algn="just">
+              <a:buFont typeface="Arial" panose="020B0604020202020204" pitchFamily="34" charset="0"/>
+              <a:buChar char="•"/>
+            </a:pPr>
+            <a:r>
+              <a:rPr lang="en-US" sz="2400" dirty="0"/>
+              <a:t>Push</a:t>
+            </a:r>
+          </a:p>
+          <a:p>
+            <a:pPr marL="800100" lvl="1" indent="-342900" algn="just">
+              <a:buFont typeface="Arial" panose="020B0604020202020204" pitchFamily="34" charset="0"/>
+              <a:buChar char="•"/>
+            </a:pPr>
+            <a:r>
+              <a:rPr lang="en-US" sz="2400" dirty="0"/>
+              <a:t>Pop</a:t>
+            </a:r>
+          </a:p>
+          <a:p>
+            <a:pPr marL="800100" lvl="1" indent="-342900" algn="just">
+              <a:buFont typeface="Arial" panose="020B0604020202020204" pitchFamily="34" charset="0"/>
+              <a:buChar char="•"/>
+            </a:pPr>
+            <a:r>
+              <a:rPr lang="en-US" sz="2400" dirty="0"/>
+              <a:t>Empty</a:t>
+            </a:r>
+          </a:p>
+          <a:p>
+            <a:pPr marL="800100" lvl="1" indent="-342900" algn="just">
+              <a:buFont typeface="Arial" panose="020B0604020202020204" pitchFamily="34" charset="0"/>
+              <a:buChar char="•"/>
+            </a:pPr>
+            <a:r>
+              <a:rPr lang="en-US" sz="2400" dirty="0"/>
+              <a:t>Full</a:t>
+            </a:r>
+            <a:endParaRPr lang="en-IN" sz="2400" dirty="0"/>
+          </a:p>
+        </p:txBody>
+      </p:sp>
+      <p:sp>
+        <p:nvSpPr>
+          <p:cNvPr id="10" name="Rectangle 9">
+            <a:extLst>
+              <a:ext uri="{FF2B5EF4-FFF2-40B4-BE49-F238E27FC236}">
+                <a16:creationId xmlns:a16="http://schemas.microsoft.com/office/drawing/2014/main" id="{35FE670A-DD3B-48E0-88CA-813329075394}"/>
+              </a:ext>
+            </a:extLst>
+          </p:cNvPr>
+          <p:cNvSpPr/>
+          <p:nvPr/>
+        </p:nvSpPr>
+        <p:spPr>
+          <a:xfrm>
+            <a:off x="-775088" y="6619164"/>
+            <a:ext cx="15449030" cy="562679"/>
+          </a:xfrm>
+          <a:prstGeom prst="rect">
+            <a:avLst/>
+          </a:prstGeom>
+          <a:solidFill>
+            <a:schemeClr val="accent5"/>
+          </a:solidFill>
+          <a:ln>
+            <a:noFill/>
+          </a:ln>
+        </p:spPr>
+        <p:style>
+          <a:lnRef idx="2">
+            <a:schemeClr val="accent1">
+              <a:shade val="50000"/>
+            </a:schemeClr>
+          </a:lnRef>
+          <a:fillRef idx="1">
+            <a:schemeClr val="accent1"/>
+          </a:fillRef>
+          <a:effectRef idx="0">
+            <a:schemeClr val="accent1"/>
+          </a:effectRef>
+          <a:fontRef idx="minor">
+            <a:schemeClr val="lt1"/>
+          </a:fontRef>
+        </p:style>
+        <p:txBody>
+          <a:bodyPr rtlCol="0" anchor="ctr"/>
+          <a:lstStyle/>
+          <a:p>
+            <a:pPr algn="ctr"/>
+            <a:endParaRPr lang="en-IN"/>
+          </a:p>
+        </p:txBody>
+      </p:sp>
+      <p:sp>
+        <p:nvSpPr>
+          <p:cNvPr id="11" name="Rectangle 10">
+            <a:extLst>
+              <a:ext uri="{FF2B5EF4-FFF2-40B4-BE49-F238E27FC236}">
+                <a16:creationId xmlns:a16="http://schemas.microsoft.com/office/drawing/2014/main" id="{0B326606-E6B3-472F-AD36-B41B29DD5BA8}"/>
+              </a:ext>
+            </a:extLst>
+          </p:cNvPr>
+          <p:cNvSpPr/>
+          <p:nvPr/>
+        </p:nvSpPr>
+        <p:spPr>
+          <a:xfrm>
+            <a:off x="6264322" y="6619164"/>
+            <a:ext cx="8779741" cy="562683"/>
+          </a:xfrm>
+          <a:prstGeom prst="rect">
+            <a:avLst/>
+          </a:prstGeom>
+          <a:solidFill>
+            <a:srgbClr val="29679F"/>
+          </a:solidFill>
+          <a:ln>
+            <a:noFill/>
+          </a:ln>
+        </p:spPr>
+        <p:style>
+          <a:lnRef idx="2">
+            <a:schemeClr val="accent1">
+              <a:shade val="50000"/>
+            </a:schemeClr>
+          </a:lnRef>
+          <a:fillRef idx="1">
+            <a:schemeClr val="accent1"/>
+          </a:fillRef>
+          <a:effectRef idx="0">
+            <a:schemeClr val="accent1"/>
+          </a:effectRef>
+          <a:fontRef idx="minor">
+            <a:schemeClr val="lt1"/>
+          </a:fontRef>
+        </p:style>
+        <p:txBody>
+          <a:bodyPr rtlCol="0" anchor="ctr"/>
+          <a:lstStyle/>
+          <a:p>
+            <a:pPr algn="ctr"/>
+            <a:endParaRPr lang="en-IN"/>
+          </a:p>
+        </p:txBody>
+      </p:sp>
+    </p:spTree>
+    <p:extLst>
+      <p:ext uri="{BB962C8B-B14F-4D97-AF65-F5344CB8AC3E}">
+        <p14:creationId xmlns:p14="http://schemas.microsoft.com/office/powerpoint/2010/main" val="3091935540"/>
+      </p:ext>
+    </p:extLst>
+  </p:cSld>
+  <p:clrMapOvr>
+    <a:masterClrMapping/>
+  </p:clrMapOvr>
+  <p:transition spd="slow">
+    <p:wipe/>
+  </p:transition>
+</p:sld>
+</file>
+
+<file path=ppt/slides/slide8.xml><?xml version="1.0" encoding="utf-8"?>
+<p:sld xmlns:a="http://schemas.openxmlformats.org/drawingml/2006/main" xmlns:r="http://schemas.openxmlformats.org/officeDocument/2006/relationships" xmlns:p="http://schemas.openxmlformats.org/presentationml/2006/main">
+  <p:cSld>
+    <p:spTree>
+      <p:nvGrpSpPr>
+        <p:cNvPr id="1" name=""/>
+        <p:cNvGrpSpPr/>
+        <p:nvPr/>
+      </p:nvGrpSpPr>
+      <p:grpSpPr>
+        <a:xfrm>
+          <a:off x="0" y="0"/>
+          <a:ext cx="0" cy="0"/>
+          <a:chOff x="0" y="0"/>
+          <a:chExt cx="0" cy="0"/>
+        </a:xfrm>
+      </p:grpSpPr>
+      <p:pic>
+        <p:nvPicPr>
+          <p:cNvPr id="4" name="Picture 3">
+            <a:extLst>
+              <a:ext uri="{FF2B5EF4-FFF2-40B4-BE49-F238E27FC236}">
+                <a16:creationId xmlns:a16="http://schemas.microsoft.com/office/drawing/2014/main" id="{1C0CB11E-23DE-42B1-9B76-FED2CA9159A1}"/>
+              </a:ext>
+            </a:extLst>
+          </p:cNvPr>
+          <p:cNvPicPr>
+            <a:picLocks noChangeAspect="1"/>
+          </p:cNvPicPr>
+          <p:nvPr/>
+        </p:nvPicPr>
+        <p:blipFill>
+          <a:blip r:embed="rId2">
+            <a:extLst>
+              <a:ext uri="{BEBA8EAE-BF5A-486C-A8C5-ECC9F3942E4B}">
+                <a14:imgProps xmlns:a14="http://schemas.microsoft.com/office/drawing/2010/main">
+                  <a14:imgLayer r:embed="rId3">
+                    <a14:imgEffect>
+                      <a14:sharpenSoften amount="-50000"/>
+                    </a14:imgEffect>
+                    <a14:imgEffect>
+                      <a14:saturation sat="33000"/>
+                    </a14:imgEffect>
+                    <a14:imgEffect>
+                      <a14:brightnessContrast bright="-20000" contrast="40000"/>
+                    </a14:imgEffect>
+                  </a14:imgLayer>
+                </a14:imgProps>
+              </a:ext>
+              <a:ext uri="{28A0092B-C50C-407E-A947-70E740481C1C}">
+                <a14:useLocalDpi xmlns:a14="http://schemas.microsoft.com/office/drawing/2010/main" val="0"/>
+              </a:ext>
+            </a:extLst>
+          </a:blip>
+          <a:stretch>
+            <a:fillRect/>
+          </a:stretch>
+        </p:blipFill>
+        <p:spPr>
+          <a:xfrm>
+            <a:off x="-7327" y="-160020"/>
+            <a:ext cx="12199327" cy="7040880"/>
+          </a:xfrm>
+          <a:prstGeom prst="rect">
+            <a:avLst/>
+          </a:prstGeom>
+        </p:spPr>
+      </p:pic>
+      <p:sp>
+        <p:nvSpPr>
+          <p:cNvPr id="2" name="TextBox 1">
+            <a:extLst>
+              <a:ext uri="{FF2B5EF4-FFF2-40B4-BE49-F238E27FC236}">
+                <a16:creationId xmlns:a16="http://schemas.microsoft.com/office/drawing/2014/main" id="{CE17348A-0661-4ECD-9D43-B61D01EEE099}"/>
+              </a:ext>
+            </a:extLst>
+          </p:cNvPr>
+          <p:cNvSpPr txBox="1"/>
+          <p:nvPr/>
+        </p:nvSpPr>
+        <p:spPr>
+          <a:xfrm>
+            <a:off x="335280" y="646152"/>
+            <a:ext cx="11521440" cy="6032421"/>
+          </a:xfrm>
+          <a:prstGeom prst="rect">
+            <a:avLst/>
+          </a:prstGeom>
+          <a:noFill/>
+        </p:spPr>
+        <p:txBody>
+          <a:bodyPr wrap="square" rtlCol="0">
+            <a:spAutoFit/>
+          </a:bodyPr>
+          <a:lstStyle/>
+          <a:p>
+            <a:pPr fontAlgn="base"/>
+            <a:r>
+              <a:rPr lang="en-US" sz="4400" b="1" dirty="0">
+                <a:solidFill>
+                  <a:schemeClr val="accent4"/>
+                </a:solidFill>
+              </a:rPr>
+              <a:t>DESIGNING AN ABSTRACT DATA TYPE IN JAVA</a:t>
+            </a:r>
+          </a:p>
+          <a:p>
+            <a:pPr fontAlgn="base"/>
+            <a:r>
+              <a:rPr lang="en-US" sz="2400" dirty="0">
+                <a:solidFill>
+                  <a:schemeClr val="bg1"/>
+                </a:solidFill>
+              </a:rPr>
+              <a:t>Here are a few rules for designing an ADT.</a:t>
+            </a:r>
+          </a:p>
+          <a:p>
+            <a:pPr fontAlgn="base"/>
+            <a:endParaRPr lang="en-US" sz="2400" dirty="0">
+              <a:solidFill>
+                <a:schemeClr val="bg1"/>
+              </a:solidFill>
+            </a:endParaRPr>
+          </a:p>
+          <a:p>
+            <a:pPr marL="342900" indent="-342900" algn="just" fontAlgn="base">
+              <a:buFont typeface="Arial" panose="020B0604020202020204" pitchFamily="34" charset="0"/>
+              <a:buChar char="•"/>
+            </a:pPr>
+            <a:r>
+              <a:rPr lang="en-US" sz="2300" dirty="0">
+                <a:solidFill>
+                  <a:schemeClr val="bg1"/>
+                </a:solidFill>
+              </a:rPr>
+              <a:t>It’s better to combine simple and few </a:t>
+            </a:r>
+            <a:r>
+              <a:rPr lang="en-US" sz="2300" dirty="0">
+                <a:solidFill>
+                  <a:schemeClr val="accent4"/>
+                </a:solidFill>
+              </a:rPr>
+              <a:t>operations in powerful ways</a:t>
+            </a:r>
+            <a:r>
+              <a:rPr lang="en-US" sz="2300" dirty="0">
+                <a:solidFill>
+                  <a:schemeClr val="bg1"/>
+                </a:solidFill>
+              </a:rPr>
+              <a:t>, rather than a lot of complex operations.</a:t>
+            </a:r>
+          </a:p>
+          <a:p>
+            <a:pPr algn="just" fontAlgn="base"/>
+            <a:endParaRPr lang="en-US" sz="2300" dirty="0">
+              <a:solidFill>
+                <a:schemeClr val="bg1"/>
+              </a:solidFill>
+            </a:endParaRPr>
+          </a:p>
+          <a:p>
+            <a:pPr marL="342900" indent="-342900" algn="just" fontAlgn="base">
+              <a:buFont typeface="Arial" panose="020B0604020202020204" pitchFamily="34" charset="0"/>
+              <a:buChar char="•"/>
+            </a:pPr>
+            <a:r>
+              <a:rPr lang="en-US" sz="2300" dirty="0">
+                <a:solidFill>
+                  <a:schemeClr val="bg1"/>
+                </a:solidFill>
+              </a:rPr>
+              <a:t>Each operation in an Abstract Data Type should have a clear purpose and should have a </a:t>
+            </a:r>
+            <a:r>
+              <a:rPr lang="en-US" sz="2300" dirty="0">
+                <a:solidFill>
+                  <a:schemeClr val="accent4"/>
+                </a:solidFill>
+              </a:rPr>
+              <a:t>logical behavior </a:t>
+            </a:r>
+            <a:r>
+              <a:rPr lang="en-US" sz="2300" dirty="0">
+                <a:solidFill>
+                  <a:schemeClr val="bg1"/>
+                </a:solidFill>
+              </a:rPr>
+              <a:t>rather than a range of </a:t>
+            </a:r>
+            <a:r>
+              <a:rPr lang="en-US" sz="2300" dirty="0">
+                <a:solidFill>
+                  <a:schemeClr val="accent4"/>
+                </a:solidFill>
+              </a:rPr>
+              <a:t>special cases</a:t>
+            </a:r>
+            <a:r>
+              <a:rPr lang="en-US" sz="2300" dirty="0">
+                <a:solidFill>
+                  <a:schemeClr val="bg1"/>
+                </a:solidFill>
+              </a:rPr>
+              <a:t>. </a:t>
+            </a:r>
+          </a:p>
+          <a:p>
+            <a:pPr algn="just" fontAlgn="base"/>
+            <a:endParaRPr lang="en-US" sz="2300" dirty="0">
+              <a:solidFill>
+                <a:schemeClr val="bg1"/>
+              </a:solidFill>
+            </a:endParaRPr>
+          </a:p>
+          <a:p>
+            <a:pPr marL="342900" indent="-342900" algn="just" fontAlgn="base">
+              <a:buFont typeface="Arial" panose="020B0604020202020204" pitchFamily="34" charset="0"/>
+              <a:buChar char="•"/>
+            </a:pPr>
+            <a:r>
+              <a:rPr lang="en-US" sz="2300" dirty="0">
+                <a:solidFill>
+                  <a:schemeClr val="bg1"/>
+                </a:solidFill>
+              </a:rPr>
+              <a:t>The set of operations should be adequate so that there are enough kinds of computations that users likely want to do.</a:t>
+            </a:r>
+          </a:p>
+          <a:p>
+            <a:pPr algn="just" fontAlgn="base"/>
+            <a:endParaRPr lang="en-US" sz="2300" dirty="0">
+              <a:solidFill>
+                <a:schemeClr val="bg1"/>
+              </a:solidFill>
+            </a:endParaRPr>
+          </a:p>
+          <a:p>
+            <a:pPr marL="342900" indent="-342900" algn="just" fontAlgn="base">
+              <a:buFont typeface="Arial" panose="020B0604020202020204" pitchFamily="34" charset="0"/>
+              <a:buChar char="•"/>
+            </a:pPr>
+            <a:r>
+              <a:rPr lang="en-US" sz="2300" dirty="0">
+                <a:solidFill>
+                  <a:schemeClr val="bg1"/>
+                </a:solidFill>
+              </a:rPr>
+              <a:t>The type may be either </a:t>
+            </a:r>
+            <a:r>
+              <a:rPr lang="en-US" sz="2300" dirty="0">
+                <a:solidFill>
+                  <a:schemeClr val="accent4"/>
+                </a:solidFill>
+              </a:rPr>
+              <a:t>generic</a:t>
+            </a:r>
+            <a:r>
+              <a:rPr lang="en-US" sz="2300" dirty="0">
+                <a:solidFill>
+                  <a:schemeClr val="bg1"/>
+                </a:solidFill>
+              </a:rPr>
+              <a:t>, for example, a graph, a list or a set, or it may be domain-specific for example, an employee database, a street map, a phone book, etc. But there should not be a combination of generic and domain-specific features.</a:t>
+            </a:r>
+          </a:p>
+          <a:p>
+            <a:endParaRPr lang="en-IN" dirty="0">
+              <a:solidFill>
+                <a:schemeClr val="bg1"/>
+              </a:solidFill>
+            </a:endParaRPr>
+          </a:p>
+        </p:txBody>
+      </p:sp>
+      <p:sp>
+        <p:nvSpPr>
+          <p:cNvPr id="6" name="Rectangle 5">
+            <a:extLst>
+              <a:ext uri="{FF2B5EF4-FFF2-40B4-BE49-F238E27FC236}">
+                <a16:creationId xmlns:a16="http://schemas.microsoft.com/office/drawing/2014/main" id="{21A8A253-56D3-4D27-8890-C4441F948D86}"/>
+              </a:ext>
+            </a:extLst>
+          </p:cNvPr>
+          <p:cNvSpPr/>
+          <p:nvPr/>
+        </p:nvSpPr>
+        <p:spPr>
+          <a:xfrm>
+            <a:off x="-434340" y="296942"/>
+            <a:ext cx="13441680" cy="45719"/>
+          </a:xfrm>
+          <a:prstGeom prst="rect">
+            <a:avLst/>
+          </a:prstGeom>
+          <a:solidFill>
+            <a:schemeClr val="accent4"/>
+          </a:solidFill>
+          <a:ln>
+            <a:noFill/>
+          </a:ln>
+        </p:spPr>
+        <p:style>
+          <a:lnRef idx="2">
+            <a:schemeClr val="accent1">
+              <a:shade val="50000"/>
+            </a:schemeClr>
+          </a:lnRef>
+          <a:fillRef idx="1">
+            <a:schemeClr val="accent1"/>
+          </a:fillRef>
+          <a:effectRef idx="0">
+            <a:schemeClr val="accent1"/>
+          </a:effectRef>
+          <a:fontRef idx="minor">
+            <a:schemeClr val="lt1"/>
+          </a:fontRef>
+        </p:style>
+        <p:txBody>
+          <a:bodyPr rtlCol="0" anchor="ctr"/>
+          <a:lstStyle/>
+          <a:p>
+            <a:pPr algn="ctr"/>
+            <a:endParaRPr lang="en-IN"/>
+          </a:p>
+        </p:txBody>
+      </p:sp>
+    </p:spTree>
+    <p:extLst>
+      <p:ext uri="{BB962C8B-B14F-4D97-AF65-F5344CB8AC3E}">
+        <p14:creationId xmlns:p14="http://schemas.microsoft.com/office/powerpoint/2010/main" val="2639321341"/>
+      </p:ext>
+    </p:extLst>
+  </p:cSld>
+  <p:clrMapOvr>
+    <a:masterClrMapping/>
+  </p:clrMapOvr>
+  <p:transition spd="slow">
+    <p:cover/>
+  </p:transition>
+</p:sld>
+</file>
+
+<file path=ppt/slides/slide9.xml><?xml version="1.0" encoding="utf-8"?>
+<p:sld xmlns:a="http://schemas.openxmlformats.org/drawingml/2006/main" xmlns:r="http://schemas.openxmlformats.org/officeDocument/2006/relationships" xmlns:p="http://schemas.openxmlformats.org/presentationml/2006/main">
+  <p:cSld>
+    <p:spTree>
+      <p:nvGrpSpPr>
+        <p:cNvPr id="1" name=""/>
+        <p:cNvGrpSpPr/>
+        <p:nvPr/>
+      </p:nvGrpSpPr>
+      <p:grpSpPr>
+        <a:xfrm>
+          <a:off x="0" y="0"/>
+          <a:ext cx="0" cy="0"/>
+          <a:chOff x="0" y="0"/>
+          <a:chExt cx="0" cy="0"/>
+        </a:xfrm>
+      </p:grpSpPr>
+      <p:sp>
+        <p:nvSpPr>
+          <p:cNvPr id="10" name="Rectangle 9">
+            <a:extLst>
+              <a:ext uri="{FF2B5EF4-FFF2-40B4-BE49-F238E27FC236}">
+                <a16:creationId xmlns:a16="http://schemas.microsoft.com/office/drawing/2014/main" id="{35FE670A-DD3B-48E0-88CA-813329075394}"/>
+              </a:ext>
+            </a:extLst>
+          </p:cNvPr>
+          <p:cNvSpPr/>
+          <p:nvPr/>
+        </p:nvSpPr>
+        <p:spPr>
+          <a:xfrm>
+            <a:off x="-775088" y="6619164"/>
+            <a:ext cx="15449030" cy="562679"/>
+          </a:xfrm>
+          <a:prstGeom prst="rect">
+            <a:avLst/>
+          </a:prstGeom>
+          <a:solidFill>
+            <a:schemeClr val="accent5"/>
+          </a:solidFill>
+          <a:ln>
+            <a:noFill/>
+          </a:ln>
+        </p:spPr>
+        <p:style>
+          <a:lnRef idx="2">
+            <a:schemeClr val="accent1">
+              <a:shade val="50000"/>
+            </a:schemeClr>
+          </a:lnRef>
+          <a:fillRef idx="1">
+            <a:schemeClr val="accent1"/>
+          </a:fillRef>
+          <a:effectRef idx="0">
+            <a:schemeClr val="accent1"/>
+          </a:effectRef>
+          <a:fontRef idx="minor">
+            <a:schemeClr val="lt1"/>
+          </a:fontRef>
+        </p:style>
+        <p:txBody>
+          <a:bodyPr rtlCol="0" anchor="ctr"/>
+          <a:lstStyle/>
+          <a:p>
+            <a:pPr algn="ctr"/>
+            <a:endParaRPr lang="en-IN"/>
+          </a:p>
+        </p:txBody>
+      </p:sp>
+      <p:sp>
+        <p:nvSpPr>
+          <p:cNvPr id="11" name="Rectangle 10">
+            <a:extLst>
+              <a:ext uri="{FF2B5EF4-FFF2-40B4-BE49-F238E27FC236}">
+                <a16:creationId xmlns:a16="http://schemas.microsoft.com/office/drawing/2014/main" id="{0B326606-E6B3-472F-AD36-B41B29DD5BA8}"/>
+              </a:ext>
+            </a:extLst>
+          </p:cNvPr>
+          <p:cNvSpPr/>
+          <p:nvPr/>
+        </p:nvSpPr>
+        <p:spPr>
+          <a:xfrm>
+            <a:off x="6264322" y="6619164"/>
+            <a:ext cx="8779741" cy="562683"/>
+          </a:xfrm>
+          <a:prstGeom prst="rect">
+            <a:avLst/>
+          </a:prstGeom>
+          <a:solidFill>
+            <a:srgbClr val="29679F"/>
+          </a:solidFill>
+          <a:ln>
+            <a:noFill/>
+          </a:ln>
+        </p:spPr>
+        <p:style>
+          <a:lnRef idx="2">
+            <a:schemeClr val="accent1">
+              <a:shade val="50000"/>
+            </a:schemeClr>
+          </a:lnRef>
+          <a:fillRef idx="1">
+            <a:schemeClr val="accent1"/>
+          </a:fillRef>
+          <a:effectRef idx="0">
+            <a:schemeClr val="accent1"/>
+          </a:effectRef>
+          <a:fontRef idx="minor">
+            <a:schemeClr val="lt1"/>
+          </a:fontRef>
+        </p:style>
+        <p:txBody>
+          <a:bodyPr rtlCol="0" anchor="ctr"/>
+          <a:lstStyle/>
+          <a:p>
+            <a:pPr algn="ctr"/>
+            <a:endParaRPr lang="en-IN"/>
+          </a:p>
+        </p:txBody>
+      </p:sp>
+      <p:sp>
+        <p:nvSpPr>
+          <p:cNvPr id="2" name="TextBox 1">
+            <a:extLst>
+              <a:ext uri="{FF2B5EF4-FFF2-40B4-BE49-F238E27FC236}">
+                <a16:creationId xmlns:a16="http://schemas.microsoft.com/office/drawing/2014/main" id="{93ABF664-6B77-474F-B60D-3EDDA251CA3D}"/>
+              </a:ext>
+            </a:extLst>
+          </p:cNvPr>
+          <p:cNvSpPr txBox="1"/>
+          <p:nvPr/>
+        </p:nvSpPr>
+        <p:spPr>
+          <a:xfrm>
+            <a:off x="185980" y="699351"/>
+            <a:ext cx="7547675" cy="5663089"/>
+          </a:xfrm>
+          <a:prstGeom prst="rect">
+            <a:avLst/>
+          </a:prstGeom>
+          <a:noFill/>
+        </p:spPr>
+        <p:txBody>
+          <a:bodyPr wrap="square" rtlCol="0">
+            <a:spAutoFit/>
+          </a:bodyPr>
+          <a:lstStyle/>
+          <a:p>
+            <a:pPr algn="just"/>
+            <a:endParaRPr lang="en-US" dirty="0"/>
+          </a:p>
+          <a:p>
+            <a:pPr algn="just"/>
+            <a:r>
+              <a:rPr lang="en-IN" sz="3600" b="1" dirty="0">
+                <a:solidFill>
+                  <a:srgbClr val="002060"/>
+                </a:solidFill>
+              </a:rPr>
+              <a:t>CONCRETE </a:t>
+            </a:r>
+            <a:r>
+              <a:rPr lang="en-IN" sz="3600" b="1" dirty="0">
+                <a:solidFill>
+                  <a:schemeClr val="accent5">
+                    <a:lumMod val="75000"/>
+                  </a:schemeClr>
+                </a:solidFill>
+              </a:rPr>
+              <a:t>STATE SPACE</a:t>
+            </a:r>
+            <a:endParaRPr lang="en-US" sz="3600" b="1" dirty="0">
+              <a:solidFill>
+                <a:schemeClr val="accent5">
+                  <a:lumMod val="75000"/>
+                </a:schemeClr>
+              </a:solidFill>
+            </a:endParaRPr>
+          </a:p>
+          <a:p>
+            <a:pPr algn="just"/>
+            <a:r>
+              <a:rPr lang="en-US" dirty="0">
+                <a:solidFill>
+                  <a:schemeClr val="tx1">
+                    <a:lumMod val="95000"/>
+                    <a:lumOff val="5000"/>
+                  </a:schemeClr>
+                </a:solidFill>
+              </a:rPr>
+              <a:t>A </a:t>
+            </a:r>
+            <a:r>
+              <a:rPr lang="en-US" dirty="0">
+                <a:solidFill>
+                  <a:schemeClr val="tx1">
+                    <a:lumMod val="95000"/>
+                    <a:lumOff val="5000"/>
+                  </a:schemeClr>
+                </a:solidFill>
+                <a:hlinkClick r:id="rId2">
+                  <a:extLst>
+                    <a:ext uri="{A12FA001-AC4F-418D-AE19-62706E023703}">
+                      <ahyp:hlinkClr xmlns:ahyp="http://schemas.microsoft.com/office/drawing/2018/hyperlinkcolor" val="tx"/>
+                    </a:ext>
+                  </a:extLst>
+                </a:hlinkClick>
+              </a:rPr>
+              <a:t>set</a:t>
+            </a:r>
+            <a:r>
+              <a:rPr lang="en-US" dirty="0">
+                <a:solidFill>
+                  <a:schemeClr val="tx1">
+                    <a:lumMod val="95000"/>
+                    <a:lumOff val="5000"/>
+                  </a:schemeClr>
+                </a:solidFill>
+              </a:rPr>
+              <a:t> of all possible math </a:t>
+            </a:r>
+            <a:r>
+              <a:rPr lang="en-US" dirty="0">
+                <a:solidFill>
+                  <a:schemeClr val="tx1">
+                    <a:lumMod val="95000"/>
+                    <a:lumOff val="5000"/>
+                  </a:schemeClr>
+                </a:solidFill>
+                <a:hlinkClick r:id="rId3">
+                  <a:extLst>
+                    <a:ext uri="{A12FA001-AC4F-418D-AE19-62706E023703}">
+                      <ahyp:hlinkClr xmlns:ahyp="http://schemas.microsoft.com/office/drawing/2018/hyperlinkcolor" val="tx"/>
+                    </a:ext>
+                  </a:extLst>
+                </a:hlinkClick>
+              </a:rPr>
+              <a:t>model</a:t>
+            </a:r>
+            <a:r>
+              <a:rPr lang="en-US" dirty="0">
+                <a:solidFill>
+                  <a:schemeClr val="tx1">
+                    <a:lumMod val="95000"/>
+                    <a:lumOff val="5000"/>
+                  </a:schemeClr>
+                </a:solidFill>
+              </a:rPr>
+              <a:t> values of the data representation. In a commutative diagram, bottom half represents concrete state space.</a:t>
+            </a:r>
+          </a:p>
+          <a:p>
+            <a:pPr algn="just"/>
+            <a:endParaRPr lang="en-US" sz="200" dirty="0"/>
+          </a:p>
+          <a:p>
+            <a:pPr algn="just"/>
+            <a:br>
+              <a:rPr lang="en-US" sz="3600" b="1" dirty="0"/>
+            </a:br>
+            <a:r>
+              <a:rPr lang="en-US" sz="3600" b="1" dirty="0">
+                <a:solidFill>
+                  <a:srgbClr val="002060"/>
+                </a:solidFill>
+              </a:rPr>
+              <a:t>CONCRETE </a:t>
+            </a:r>
+            <a:r>
+              <a:rPr lang="en-US" sz="3600" b="1" dirty="0">
+                <a:solidFill>
+                  <a:schemeClr val="accent5">
+                    <a:lumMod val="75000"/>
+                  </a:schemeClr>
+                </a:solidFill>
+              </a:rPr>
+              <a:t>INVARIANT</a:t>
+            </a:r>
+          </a:p>
+          <a:p>
+            <a:pPr algn="just"/>
+            <a:r>
+              <a:rPr lang="en-US" dirty="0"/>
+              <a:t>An invariant is a property that is always true of an ADT object instance, for the lifetime of the object.</a:t>
+            </a:r>
+          </a:p>
+          <a:p>
+            <a:pPr marL="285750" indent="-285750" algn="just">
+              <a:buFont typeface="Wingdings" panose="05000000000000000000" pitchFamily="2" charset="2"/>
+              <a:buChar char="§"/>
+            </a:pPr>
+            <a:r>
+              <a:rPr lang="en-US" dirty="0"/>
+              <a:t>A good ADT preserves its own invariants. Invariants must be established by creators and producers, and preserved by observers and mutators.</a:t>
+            </a:r>
+          </a:p>
+          <a:p>
+            <a:pPr marL="285750" indent="-285750" algn="just">
+              <a:buFont typeface="Wingdings" panose="05000000000000000000" pitchFamily="2" charset="2"/>
+              <a:buChar char="§"/>
+            </a:pPr>
+            <a:r>
+              <a:rPr lang="en-US" dirty="0"/>
+              <a:t>The rep invariant specifies legal values of the representation, and should be checked at runtime with </a:t>
+            </a:r>
+            <a:r>
+              <a:rPr lang="en-US" dirty="0" err="1"/>
+              <a:t>checkRep</a:t>
+            </a:r>
+            <a:r>
+              <a:rPr lang="en-US" dirty="0"/>
+              <a:t>().</a:t>
+            </a:r>
+          </a:p>
+          <a:p>
+            <a:pPr marL="285750" indent="-285750" algn="just">
+              <a:buFont typeface="Wingdings" panose="05000000000000000000" pitchFamily="2" charset="2"/>
+              <a:buChar char="§"/>
+            </a:pPr>
+            <a:r>
+              <a:rPr lang="en-US" dirty="0"/>
+              <a:t>The abstraction function maps a concrete representation to the abstract value it </a:t>
+            </a:r>
+            <a:r>
+              <a:rPr lang="en-US" dirty="0" err="1"/>
+              <a:t>represents.Representation</a:t>
+            </a:r>
+            <a:r>
+              <a:rPr lang="en-US" dirty="0"/>
+              <a:t> exposure threatens both representation independence and invariant preservation.</a:t>
+            </a:r>
+          </a:p>
+          <a:p>
+            <a:pPr algn="just"/>
+            <a:endParaRPr lang="en-US" dirty="0"/>
+          </a:p>
+          <a:p>
+            <a:pPr algn="just"/>
+            <a:endParaRPr lang="en-IN" dirty="0"/>
+          </a:p>
+        </p:txBody>
+      </p:sp>
+      <p:pic>
+        <p:nvPicPr>
+          <p:cNvPr id="9220" name="Picture 4" descr="Transformation of State Space under Abstraction Two fundamental... |  Download Scientific Diagram">
+            <a:extLst>
+              <a:ext uri="{FF2B5EF4-FFF2-40B4-BE49-F238E27FC236}">
+                <a16:creationId xmlns:a16="http://schemas.microsoft.com/office/drawing/2014/main" id="{0BEA55EA-2E06-4BF4-91AF-CB609388F892}"/>
+              </a:ext>
+            </a:extLst>
+          </p:cNvPr>
+          <p:cNvPicPr>
+            <a:picLocks noChangeAspect="1" noChangeArrowheads="1"/>
+          </p:cNvPicPr>
+          <p:nvPr/>
+        </p:nvPicPr>
+        <p:blipFill rotWithShape="1">
+          <a:blip r:embed="rId4">
+            <a:extLst>
+              <a:ext uri="{28A0092B-C50C-407E-A947-70E740481C1C}">
+                <a14:useLocalDpi xmlns:a14="http://schemas.microsoft.com/office/drawing/2010/main" val="0"/>
+              </a:ext>
+            </a:extLst>
+          </a:blip>
+          <a:srcRect r="60606"/>
+          <a:stretch/>
+        </p:blipFill>
+        <p:spPr bwMode="auto">
+          <a:xfrm>
+            <a:off x="7733654" y="1899358"/>
+            <a:ext cx="4220731" cy="3711028"/>
+          </a:xfrm>
+          <a:prstGeom prst="rect">
+            <a:avLst/>
+          </a:prstGeom>
+          <a:noFill/>
+          <a:extLst>
+            <a:ext uri="{909E8E84-426E-40DD-AFC4-6F175D3DCCD1}">
+              <a14:hiddenFill xmlns:a14="http://schemas.microsoft.com/office/drawing/2010/main">
+                <a:solidFill>
+                  <a:srgbClr val="FFFFFF"/>
+                </a:solidFill>
+              </a14:hiddenFill>
+            </a:ext>
+          </a:extLst>
+        </p:spPr>
+      </p:pic>
+      <p:pic>
+        <p:nvPicPr>
+          <p:cNvPr id="13" name="Picture 12">
+            <a:extLst>
+              <a:ext uri="{FF2B5EF4-FFF2-40B4-BE49-F238E27FC236}">
+                <a16:creationId xmlns:a16="http://schemas.microsoft.com/office/drawing/2014/main" id="{3108CA91-177B-4F9A-AA30-262B67B71210}"/>
+              </a:ext>
+            </a:extLst>
+          </p:cNvPr>
+          <p:cNvPicPr>
+            <a:picLocks noChangeAspect="1"/>
+          </p:cNvPicPr>
+          <p:nvPr/>
+        </p:nvPicPr>
+        <p:blipFill>
+          <a:blip r:embed="rId5">
+            <a:extLst>
+              <a:ext uri="{BEBA8EAE-BF5A-486C-A8C5-ECC9F3942E4B}">
+                <a14:imgProps xmlns:a14="http://schemas.microsoft.com/office/drawing/2010/main">
+                  <a14:imgLayer r:embed="rId6">
+                    <a14:imgEffect>
+                      <a14:sharpenSoften amount="-50000"/>
+                    </a14:imgEffect>
+                    <a14:imgEffect>
+                      <a14:saturation sat="33000"/>
+                    </a14:imgEffect>
+                    <a14:imgEffect>
+                      <a14:brightnessContrast bright="-20000" contrast="40000"/>
+                    </a14:imgEffect>
+                  </a14:imgLayer>
+                </a14:imgProps>
+              </a:ext>
+              <a:ext uri="{28A0092B-C50C-407E-A947-70E740481C1C}">
+                <a14:useLocalDpi xmlns:a14="http://schemas.microsoft.com/office/drawing/2010/main" val="0"/>
+              </a:ext>
+            </a:extLst>
+          </a:blip>
+          <a:stretch>
+            <a:fillRect/>
+          </a:stretch>
+        </p:blipFill>
+        <p:spPr>
+          <a:xfrm>
+            <a:off x="-7327" y="-1301858"/>
+            <a:ext cx="12199327" cy="1673432"/>
+          </a:xfrm>
+          <a:prstGeom prst="rect">
+            <a:avLst/>
+          </a:prstGeom>
+        </p:spPr>
+      </p:pic>
+    </p:spTree>
+    <p:extLst>
+      <p:ext uri="{BB962C8B-B14F-4D97-AF65-F5344CB8AC3E}">
+        <p14:creationId xmlns:p14="http://schemas.microsoft.com/office/powerpoint/2010/main" val="525202916"/>
+      </p:ext>
+    </p:extLst>
+  </p:cSld>
+  <p:clrMapOvr>
+    <a:masterClrMapping/>
+  </p:clrMapOvr>
+  <mc:AlternateContent xmlns:mc="http://schemas.openxmlformats.org/markup-compatibility/2006">
+    <mc:Choice xmlns:p15="http://schemas.microsoft.com/office/powerpoint/2012/main" Requires="p15">
+      <p:transition xmlns:p14="http://schemas.microsoft.com/office/powerpoint/2010/main" spd="slow" p14:dur="1250">
+        <p15:prstTrans prst="pageCurlDouble"/>
+      </p:transition>
+    </mc:Choice>
+    <mc:Fallback>
+      <p:transition spd="slow">
+        <p:fade/>
+      </p:transition>
+    </mc:Fallback>
+  </mc:AlternateContent>
 </p:sld>
 </file>
 

</xml_diff>